<commit_message>
Fix broken dataset links
</commit_message>
<xml_diff>
--- a/tutorials/SlicerRT_Tutorial_IGRT_4.11.pptx
+++ b/tutorials/SlicerRT_Tutorial_IGRT_4.11.pptx
@@ -301,7 +301,7 @@
           <a:p>
             <a:fld id="{631D9270-7B54-4D7C-8DD4-CF63D88EDDCF}" type="datetimeFigureOut">
               <a:rPr lang="en-US" smtClean="0"/>
-              <a:t>2019-08-08</a:t>
+              <a:t>2021-01-26</a:t>
             </a:fld>
             <a:endParaRPr lang="en-US"/>
           </a:p>
@@ -491,7 +491,7 @@
               <a:pPr>
                 <a:defRPr/>
               </a:pPr>
-              <a:t>2019-08-08</a:t>
+              <a:t>2021-01-26</a:t>
             </a:fld>
             <a:endParaRPr lang="en-US"/>
           </a:p>
@@ -527,7 +527,7 @@
           <a:lstStyle/>
           <a:p>
             <a:pPr lvl="0"/>
-            <a:endParaRPr lang="en-US" noProof="0" smtClean="0"/>
+            <a:endParaRPr lang="en-US" noProof="0"/>
           </a:p>
         </p:txBody>
       </p:sp>
@@ -558,35 +558,35 @@
           <a:p>
             <a:pPr lvl="0"/>
             <a:r>
-              <a:rPr lang="en-US" noProof="0" smtClean="0"/>
+              <a:rPr lang="en-US" noProof="0"/>
               <a:t>Click to edit Master text styles</a:t>
             </a:r>
           </a:p>
           <a:p>
             <a:pPr lvl="1"/>
             <a:r>
-              <a:rPr lang="en-US" noProof="0" smtClean="0"/>
+              <a:rPr lang="en-US" noProof="0"/>
               <a:t>Second level</a:t>
             </a:r>
           </a:p>
           <a:p>
             <a:pPr lvl="2"/>
             <a:r>
-              <a:rPr lang="en-US" noProof="0" smtClean="0"/>
+              <a:rPr lang="en-US" noProof="0"/>
               <a:t>Third level</a:t>
             </a:r>
           </a:p>
           <a:p>
             <a:pPr lvl="3"/>
             <a:r>
-              <a:rPr lang="en-US" noProof="0" smtClean="0"/>
+              <a:rPr lang="en-US" noProof="0"/>
               <a:t>Fourth level</a:t>
             </a:r>
           </a:p>
           <a:p>
             <a:pPr lvl="4"/>
             <a:r>
-              <a:rPr lang="en-US" noProof="0" smtClean="0"/>
+              <a:rPr lang="en-US" noProof="0"/>
               <a:t>Fifth level</a:t>
             </a:r>
           </a:p>
@@ -1008,10 +1008,9 @@
           <a:lstStyle/>
           <a:p>
             <a:r>
-              <a:rPr lang="en-US" smtClean="0"/>
+              <a:rPr lang="en-US"/>
               <a:t>Click to edit Master title style</a:t>
             </a:r>
-            <a:endParaRPr lang="en-US"/>
           </a:p>
         </p:txBody>
       </p:sp>
@@ -1127,10 +1126,9 @@
           </a:lstStyle>
           <a:p>
             <a:r>
-              <a:rPr lang="en-US" smtClean="0"/>
+              <a:rPr lang="en-US"/>
               <a:t>Click to edit Master subtitle style</a:t>
             </a:r>
-            <a:endParaRPr lang="en-US"/>
           </a:p>
         </p:txBody>
       </p:sp>
@@ -1275,38 +1273,37 @@
           <a:p>
             <a:pPr lvl="0"/>
             <a:r>
-              <a:rPr lang="en-US" dirty="0" smtClean="0"/>
+              <a:rPr lang="en-US" dirty="0"/>
               <a:t>Click to edit Master text styles</a:t>
             </a:r>
           </a:p>
           <a:p>
             <a:pPr lvl="1"/>
             <a:r>
-              <a:rPr lang="en-US" dirty="0" smtClean="0"/>
+              <a:rPr lang="en-US" dirty="0"/>
               <a:t>Second level</a:t>
             </a:r>
           </a:p>
           <a:p>
             <a:pPr lvl="2"/>
             <a:r>
-              <a:rPr lang="en-US" dirty="0" smtClean="0"/>
+              <a:rPr lang="en-US" dirty="0"/>
               <a:t>Third level</a:t>
             </a:r>
           </a:p>
           <a:p>
             <a:pPr lvl="3"/>
             <a:r>
-              <a:rPr lang="en-US" dirty="0" smtClean="0"/>
+              <a:rPr lang="en-US" dirty="0"/>
               <a:t>Fourth level</a:t>
             </a:r>
           </a:p>
           <a:p>
             <a:pPr lvl="4"/>
             <a:r>
-              <a:rPr lang="en-US" dirty="0" smtClean="0"/>
+              <a:rPr lang="en-US" dirty="0"/>
               <a:t>Fifth level</a:t>
             </a:r>
-            <a:endParaRPr lang="en-US" dirty="0"/>
           </a:p>
         </p:txBody>
       </p:sp>
@@ -1342,10 +1339,9 @@
           </a:lstStyle>
           <a:p>
             <a:r>
-              <a:rPr lang="en-US" dirty="0" smtClean="0"/>
+              <a:rPr lang="en-US" dirty="0"/>
               <a:t>Click to edit Master title style</a:t>
             </a:r>
-            <a:endParaRPr lang="en-US" dirty="0"/>
           </a:p>
         </p:txBody>
       </p:sp>
@@ -1377,7 +1373,7 @@
               <a:defRPr/>
             </a:pPr>
             <a:r>
-              <a:rPr lang="en-US" dirty="0" smtClean="0"/>
+              <a:rPr lang="en-US" dirty="0"/>
               <a:t>- </a:t>
             </a:r>
             <a:fld id="{CF70E430-998E-4908-836F-E9BC2B613AC2}" type="slidenum">
@@ -1388,10 +1384,9 @@
               <a:t>‹#›</a:t>
             </a:fld>
             <a:r>
-              <a:rPr lang="en-US" dirty="0" smtClean="0"/>
+              <a:rPr lang="en-US" dirty="0"/>
               <a:t> -</a:t>
             </a:r>
-            <a:endParaRPr lang="en-US" dirty="0"/>
           </a:p>
         </p:txBody>
       </p:sp>
@@ -1423,10 +1418,9 @@
               <a:defRPr/>
             </a:pPr>
             <a:r>
-              <a:rPr lang="en-US" dirty="0" smtClean="0"/>
+              <a:rPr lang="en-US" dirty="0"/>
               <a:t>Laboratory for Percutaneous Surgery – Copyright © Queen’s University, 2019</a:t>
             </a:r>
-            <a:endParaRPr lang="en-US" dirty="0"/>
           </a:p>
         </p:txBody>
       </p:sp>
@@ -1517,10 +1511,9 @@
           </a:lstStyle>
           <a:p>
             <a:r>
-              <a:rPr lang="en-US" dirty="0" smtClean="0"/>
+              <a:rPr lang="en-US" dirty="0"/>
               <a:t>Click to edit Master title style</a:t>
             </a:r>
-            <a:endParaRPr lang="en-US" dirty="0"/>
           </a:p>
         </p:txBody>
       </p:sp>
@@ -1616,7 +1609,7 @@
               <a:defRPr/>
             </a:pPr>
             <a:r>
-              <a:rPr lang="en-US" dirty="0" smtClean="0"/>
+              <a:rPr lang="en-US" dirty="0"/>
               <a:t>- </a:t>
             </a:r>
             <a:fld id="{CF70E430-998E-4908-836F-E9BC2B613AC2}" type="slidenum">
@@ -1627,10 +1620,9 @@
               <a:t>‹#›</a:t>
             </a:fld>
             <a:r>
-              <a:rPr lang="en-US" dirty="0" smtClean="0"/>
+              <a:rPr lang="en-US" dirty="0"/>
               <a:t> -</a:t>
             </a:r>
-            <a:endParaRPr lang="en-US" dirty="0"/>
           </a:p>
         </p:txBody>
       </p:sp>
@@ -1662,10 +1654,9 @@
               <a:defRPr/>
             </a:pPr>
             <a:r>
-              <a:rPr lang="en-US" dirty="0" smtClean="0"/>
+              <a:rPr lang="en-US" dirty="0"/>
               <a:t>Laboratory for Percutaneous Surgery – Copyright © Queen’s University, 2019</a:t>
             </a:r>
-            <a:endParaRPr lang="en-US" dirty="0"/>
           </a:p>
         </p:txBody>
       </p:sp>
@@ -1816,7 +1807,7 @@
               <a:defRPr/>
             </a:pPr>
             <a:r>
-              <a:rPr lang="en-US" dirty="0" smtClean="0"/>
+              <a:rPr lang="en-US" dirty="0"/>
               <a:t>- </a:t>
             </a:r>
             <a:fld id="{CF70E430-998E-4908-836F-E9BC2B613AC2}" type="slidenum">
@@ -1827,10 +1818,9 @@
               <a:t>‹#›</a:t>
             </a:fld>
             <a:r>
-              <a:rPr lang="en-US" dirty="0" smtClean="0"/>
+              <a:rPr lang="en-US" dirty="0"/>
               <a:t> -</a:t>
             </a:r>
-            <a:endParaRPr lang="en-US" dirty="0"/>
           </a:p>
         </p:txBody>
       </p:sp>
@@ -1862,10 +1852,9 @@
               <a:defRPr/>
             </a:pPr>
             <a:r>
-              <a:rPr lang="en-US" dirty="0" smtClean="0"/>
+              <a:rPr lang="en-US" dirty="0"/>
               <a:t>Laboratory for Percutaneous Surgery – Copyright © Queen’s University, 2019</a:t>
             </a:r>
-            <a:endParaRPr lang="en-US" dirty="0"/>
           </a:p>
         </p:txBody>
       </p:sp>
@@ -1965,7 +1954,7 @@
           <a:p>
             <a:pPr lvl="0"/>
             <a:r>
-              <a:rPr lang="en-US" smtClean="0"/>
+              <a:rPr lang="en-US"/>
               <a:t>Click to edit Master title style</a:t>
             </a:r>
           </a:p>
@@ -2007,35 +1996,35 @@
           <a:p>
             <a:pPr lvl="0"/>
             <a:r>
-              <a:rPr lang="en-US" smtClean="0"/>
+              <a:rPr lang="en-US"/>
               <a:t>Click to edit Master text styles</a:t>
             </a:r>
           </a:p>
           <a:p>
             <a:pPr lvl="1"/>
             <a:r>
-              <a:rPr lang="en-US" smtClean="0"/>
+              <a:rPr lang="en-US"/>
               <a:t>Second level</a:t>
             </a:r>
           </a:p>
           <a:p>
             <a:pPr lvl="2"/>
             <a:r>
-              <a:rPr lang="en-US" smtClean="0"/>
+              <a:rPr lang="en-US"/>
               <a:t>Third level</a:t>
             </a:r>
           </a:p>
           <a:p>
             <a:pPr lvl="3"/>
             <a:r>
-              <a:rPr lang="en-US" smtClean="0"/>
+              <a:rPr lang="en-US"/>
               <a:t>Fourth level</a:t>
             </a:r>
           </a:p>
           <a:p>
             <a:pPr lvl="4"/>
             <a:r>
-              <a:rPr lang="en-US" smtClean="0"/>
+              <a:rPr lang="en-US"/>
               <a:t>Fifth level</a:t>
             </a:r>
           </a:p>
@@ -2085,10 +2074,9 @@
               <a:defRPr/>
             </a:pPr>
             <a:r>
-              <a:rPr lang="en-US" dirty="0" smtClean="0"/>
+              <a:rPr lang="en-US" dirty="0"/>
               <a:t>Laboratory for Percutaneous Surgery (The Perk Lab) – Copyright © Queen’s University, 2019</a:t>
             </a:r>
-            <a:endParaRPr lang="en-US" dirty="0"/>
           </a:p>
         </p:txBody>
       </p:sp>
@@ -2584,30 +2572,22 @@
           <a:p>
             <a:pPr eaLnBrk="1" hangingPunct="1"/>
             <a:r>
-              <a:rPr lang="en-CA" sz="5400" b="1" dirty="0" smtClean="0"/>
+              <a:rPr lang="en-CA" sz="5400" b="1" dirty="0"/>
               <a:t>Tutorial:</a:t>
             </a:r>
             <a:br>
-              <a:rPr lang="en-CA" sz="5400" b="1" dirty="0" smtClean="0"/>
+              <a:rPr lang="en-CA" sz="5400" b="1" dirty="0"/>
             </a:br>
             <a:r>
-              <a:rPr lang="en-CA" sz="5400" b="1" dirty="0" smtClean="0">
+              <a:rPr lang="en-CA" sz="5400" b="1" dirty="0">
                 <a:solidFill>
                   <a:srgbClr val="780000"/>
                 </a:solidFill>
               </a:rPr>
-              <a:t>I</a:t>
-            </a:r>
-            <a:r>
-              <a:rPr lang="en-CA" sz="5400" b="1" dirty="0" smtClean="0">
-                <a:solidFill>
-                  <a:srgbClr val="780000"/>
-                </a:solidFill>
-              </a:rPr>
-              <a:t>mage-guided radiation therapy via </a:t>
-            </a:r>
-            <a:r>
-              <a:rPr lang="en-CA" sz="5400" b="1" dirty="0" err="1" smtClean="0">
+              <a:t>Image-guided radiation therapy via </a:t>
+            </a:r>
+            <a:r>
+              <a:rPr lang="en-CA" sz="5400" b="1" dirty="0" err="1">
                 <a:solidFill>
                   <a:srgbClr val="780000"/>
                 </a:solidFill>
@@ -2615,7 +2595,7 @@
               <a:t>isocenter</a:t>
             </a:r>
             <a:r>
-              <a:rPr lang="en-CA" sz="5400" b="1" dirty="0" smtClean="0">
+              <a:rPr lang="en-CA" sz="5400" b="1" dirty="0">
                 <a:solidFill>
                   <a:srgbClr val="780000"/>
                 </a:solidFill>
@@ -2659,7 +2639,7 @@
               <a:defRPr/>
             </a:pPr>
             <a:r>
-              <a:rPr lang="en-US" sz="2400" dirty="0" smtClean="0">
+              <a:rPr lang="en-US" sz="2400" dirty="0">
                 <a:solidFill>
                   <a:schemeClr val="tx1"/>
                 </a:solidFill>
@@ -2711,34 +2691,10 @@
               <a:defRPr/>
             </a:pPr>
             <a:r>
-              <a:rPr lang="en-CA" dirty="0" smtClean="0">
-                <a:latin typeface="+mn-lt"/>
-              </a:rPr>
-              <a:t>Laboratory </a:t>
-            </a:r>
-            <a:r>
               <a:rPr lang="en-CA" dirty="0">
                 <a:latin typeface="+mn-lt"/>
               </a:rPr>
-              <a:t>for Percutaneous </a:t>
-            </a:r>
-            <a:r>
-              <a:rPr lang="en-CA" dirty="0" smtClean="0">
-                <a:latin typeface="+mn-lt"/>
-              </a:rPr>
-              <a:t>Surgery, Queen’s </a:t>
-            </a:r>
-            <a:r>
-              <a:rPr lang="en-CA" dirty="0">
-                <a:latin typeface="+mn-lt"/>
-              </a:rPr>
-              <a:t>University, </a:t>
-            </a:r>
-            <a:r>
-              <a:rPr lang="en-CA" dirty="0" smtClean="0">
-                <a:latin typeface="+mn-lt"/>
-              </a:rPr>
-              <a:t>Kingston, ON, Canada</a:t>
+              <a:t>Laboratory for Percutaneous Surgery, Queen’s University, Kingston, ON, Canada</a:t>
             </a:r>
             <a:endParaRPr lang="en-US" dirty="0">
               <a:latin typeface="+mn-lt"/>
@@ -2759,13 +2715,6 @@
       <p:transition spd="slow" advTm="13814"/>
     </mc:Fallback>
   </mc:AlternateContent>
-  <p:timing>
-    <p:tnLst>
-      <p:par>
-        <p:cTn id="1" dur="indefinite" restart="never" nodeType="tmRoot"/>
-      </p:par>
-    </p:tnLst>
-  </p:timing>
 </p:sld>
 </file>
 
@@ -2836,14 +2785,9 @@
           <a:lstStyle/>
           <a:p>
             <a:r>
-              <a:rPr lang="en-US" dirty="0" smtClean="0"/>
-              <a:t>2/3. </a:t>
-            </a:r>
-            <a:r>
-              <a:rPr lang="en-US" dirty="0" smtClean="0"/>
-              <a:t>Load DICOM dataset</a:t>
-            </a:r>
-            <a:endParaRPr lang="en-US" dirty="0"/>
+              <a:rPr lang="en-US" dirty="0"/>
+              <a:t>2/3. Load DICOM dataset</a:t>
+            </a:r>
           </a:p>
         </p:txBody>
       </p:sp>
@@ -2866,7 +2810,7 @@
               <a:defRPr/>
             </a:pPr>
             <a:r>
-              <a:rPr lang="en-US" smtClean="0"/>
+              <a:rPr lang="en-US"/>
               <a:t>- </a:t>
             </a:r>
             <a:fld id="{CF70E430-998E-4908-836F-E9BC2B613AC2}" type="slidenum">
@@ -2877,7 +2821,7 @@
               <a:t>10</a:t>
             </a:fld>
             <a:r>
-              <a:rPr lang="en-US" smtClean="0"/>
+              <a:rPr lang="en-US"/>
               <a:t> -</a:t>
             </a:r>
             <a:endParaRPr lang="en-US" dirty="0"/>
@@ -2903,7 +2847,7 @@
               <a:defRPr/>
             </a:pPr>
             <a:r>
-              <a:rPr lang="en-US" smtClean="0"/>
+              <a:rPr lang="en-US"/>
               <a:t>Laboratory for Percutaneous Surgery – Copyright © Queen’s University, 2019</a:t>
             </a:r>
             <a:endParaRPr lang="en-US" dirty="0"/>
@@ -3080,11 +3024,11 @@
           </a:lstStyle>
           <a:p>
             <a:r>
-              <a:rPr lang="en-US" dirty="0" smtClean="0"/>
+              <a:rPr lang="en-US" dirty="0"/>
               <a:t>Note: You can add/remove selected items with </a:t>
             </a:r>
             <a:r>
-              <a:rPr lang="en-US" dirty="0" err="1" smtClean="0"/>
+              <a:rPr lang="en-US" dirty="0" err="1"/>
               <a:t>Ctrl+click</a:t>
             </a:r>
             <a:endParaRPr lang="en-US" dirty="0"/>
@@ -3231,14 +3175,9 @@
           <a:lstStyle/>
           <a:p>
             <a:r>
-              <a:rPr lang="en-US" dirty="0" smtClean="0"/>
-              <a:t>2/4. </a:t>
-            </a:r>
-            <a:r>
-              <a:rPr lang="en-US" dirty="0" smtClean="0"/>
-              <a:t>Data loaded</a:t>
-            </a:r>
-            <a:endParaRPr lang="en-US" dirty="0"/>
+              <a:rPr lang="en-US" dirty="0"/>
+              <a:t>2/4. Data loaded</a:t>
+            </a:r>
           </a:p>
         </p:txBody>
       </p:sp>
@@ -3261,7 +3200,7 @@
               <a:defRPr/>
             </a:pPr>
             <a:r>
-              <a:rPr lang="en-US" smtClean="0"/>
+              <a:rPr lang="en-US"/>
               <a:t>- </a:t>
             </a:r>
             <a:fld id="{CF70E430-998E-4908-836F-E9BC2B613AC2}" type="slidenum">
@@ -3272,7 +3211,7 @@
               <a:t>11</a:t>
             </a:fld>
             <a:r>
-              <a:rPr lang="en-US" smtClean="0"/>
+              <a:rPr lang="en-US"/>
               <a:t> -</a:t>
             </a:r>
             <a:endParaRPr lang="en-US" dirty="0"/>
@@ -3298,7 +3237,7 @@
               <a:defRPr/>
             </a:pPr>
             <a:r>
-              <a:rPr lang="en-US" smtClean="0"/>
+              <a:rPr lang="en-US"/>
               <a:t>Laboratory for Percutaneous Surgery – Copyright © Queen’s University, 2019</a:t>
             </a:r>
             <a:endParaRPr lang="en-US" dirty="0"/>
@@ -3408,7 +3347,7 @@
               <a:defRPr/>
             </a:pPr>
             <a:r>
-              <a:rPr lang="en-US" sz="2400" dirty="0" smtClean="0">
+              <a:rPr lang="en-US" sz="2400" dirty="0">
                 <a:solidFill>
                   <a:schemeClr val="bg1"/>
                 </a:solidFill>
@@ -3422,7 +3361,7 @@
               <a:defRPr/>
             </a:pPr>
             <a:r>
-              <a:rPr lang="en-US" sz="2400" dirty="0" smtClean="0">
+              <a:rPr lang="en-US" sz="2400" dirty="0">
                 <a:solidFill>
                   <a:schemeClr val="bg1"/>
                 </a:solidFill>
@@ -3430,25 +3369,20 @@
               <a:t>Switch to Data module</a:t>
             </a:r>
             <a:br>
-              <a:rPr lang="en-US" sz="2400" dirty="0" smtClean="0">
+              <a:rPr lang="en-US" sz="2400" dirty="0">
                 <a:solidFill>
                   <a:schemeClr val="bg1"/>
                 </a:solidFill>
               </a:rPr>
             </a:br>
             <a:r>
-              <a:rPr lang="en-US" sz="2400" dirty="0" smtClean="0">
+              <a:rPr lang="en-US" sz="2400" dirty="0">
                 <a:solidFill>
                   <a:schemeClr val="bg1"/>
                 </a:solidFill>
               </a:rPr>
               <a:t>to check loaded objects</a:t>
             </a:r>
-            <a:endParaRPr lang="en-US" sz="2400" dirty="0">
-              <a:solidFill>
-                <a:schemeClr val="bg1"/>
-              </a:solidFill>
-            </a:endParaRPr>
           </a:p>
         </p:txBody>
       </p:sp>
@@ -3498,10 +3432,9 @@
           <a:lstStyle/>
           <a:p>
             <a:r>
-              <a:rPr lang="en-US" dirty="0" smtClean="0"/>
+              <a:rPr lang="en-US" dirty="0"/>
               <a:t>2/5. Show CT and dose</a:t>
             </a:r>
-            <a:endParaRPr lang="en-US" dirty="0"/>
           </a:p>
         </p:txBody>
       </p:sp>
@@ -3524,7 +3457,7 @@
               <a:defRPr/>
             </a:pPr>
             <a:r>
-              <a:rPr lang="en-US" smtClean="0"/>
+              <a:rPr lang="en-US"/>
               <a:t>- </a:t>
             </a:r>
             <a:fld id="{CF70E430-998E-4908-836F-E9BC2B613AC2}" type="slidenum">
@@ -3535,7 +3468,7 @@
               <a:t>12</a:t>
             </a:fld>
             <a:r>
-              <a:rPr lang="en-US" smtClean="0"/>
+              <a:rPr lang="en-US"/>
               <a:t> -</a:t>
             </a:r>
             <a:endParaRPr lang="en-US" dirty="0"/>
@@ -3561,7 +3494,7 @@
               <a:defRPr/>
             </a:pPr>
             <a:r>
-              <a:rPr lang="en-US" smtClean="0"/>
+              <a:rPr lang="en-US"/>
               <a:t>Laboratory for Percutaneous Surgery – Copyright © Queen’s University, 2019</a:t>
             </a:r>
             <a:endParaRPr lang="en-US" dirty="0"/>
@@ -3652,25 +3585,16 @@
           </a:lstStyle>
           <a:p>
             <a:r>
-              <a:rPr lang="en-US" dirty="0" smtClean="0"/>
-              <a:t>- Left-click visibility </a:t>
-            </a:r>
-            <a:r>
               <a:rPr lang="en-US" dirty="0"/>
-              <a:t>icon </a:t>
-            </a:r>
-            <a:r>
-              <a:rPr lang="en-US" dirty="0" smtClean="0"/>
-              <a:t>to show/hide items, including volumes</a:t>
+              <a:t>- Left-click visibility icon to show/hide items, including volumes</a:t>
             </a:r>
             <a:br>
-              <a:rPr lang="en-US" dirty="0" smtClean="0"/>
+              <a:rPr lang="en-US" dirty="0"/>
             </a:br>
             <a:r>
-              <a:rPr lang="en-US" dirty="0" smtClean="0"/>
+              <a:rPr lang="en-US" dirty="0"/>
               <a:t>- Right-click visibility icon to access visibility options</a:t>
             </a:r>
-            <a:endParaRPr lang="en-US" dirty="0"/>
           </a:p>
         </p:txBody>
       </p:sp>
@@ -3900,10 +3824,9 @@
           <a:lstStyle/>
           <a:p>
             <a:r>
-              <a:rPr lang="en-US" dirty="0" smtClean="0"/>
+              <a:rPr lang="en-US" dirty="0"/>
               <a:t>2/5A. Alternative volume visibility</a:t>
             </a:r>
-            <a:endParaRPr lang="en-US" dirty="0"/>
           </a:p>
         </p:txBody>
       </p:sp>
@@ -3926,7 +3849,7 @@
               <a:defRPr/>
             </a:pPr>
             <a:r>
-              <a:rPr lang="en-US" smtClean="0"/>
+              <a:rPr lang="en-US"/>
               <a:t>- </a:t>
             </a:r>
             <a:fld id="{CF70E430-998E-4908-836F-E9BC2B613AC2}" type="slidenum">
@@ -3937,7 +3860,7 @@
               <a:t>13</a:t>
             </a:fld>
             <a:r>
-              <a:rPr lang="en-US" smtClean="0"/>
+              <a:rPr lang="en-US"/>
               <a:t> -</a:t>
             </a:r>
             <a:endParaRPr lang="en-US" dirty="0"/>
@@ -3963,7 +3886,7 @@
               <a:defRPr/>
             </a:pPr>
             <a:r>
-              <a:rPr lang="en-US" smtClean="0"/>
+              <a:rPr lang="en-US"/>
               <a:t>Laboratory for Percutaneous Surgery – Copyright © Queen’s University, 2019</a:t>
             </a:r>
             <a:endParaRPr lang="en-US" dirty="0"/>
@@ -4056,24 +3979,15 @@
           <a:p>
             <a:r>
               <a:rPr lang="en-US" dirty="0"/>
-              <a:t>2. </a:t>
-            </a:r>
-            <a:r>
+              <a:t>2. Link slices</a:t>
+            </a:r>
+            <a:br>
               <a:rPr lang="en-US" dirty="0"/>
-              <a:t>Link </a:t>
-            </a:r>
-            <a:r>
-              <a:rPr lang="en-US" dirty="0" smtClean="0"/>
-              <a:t>slices</a:t>
-            </a:r>
-            <a:br>
-              <a:rPr lang="en-US" dirty="0" smtClean="0"/>
             </a:br>
             <a:r>
-              <a:rPr lang="en-US" dirty="0" smtClean="0"/>
+              <a:rPr lang="en-US" dirty="0"/>
               <a:t>3. Choose CT</a:t>
             </a:r>
-            <a:endParaRPr lang="en-US" dirty="0"/>
           </a:p>
         </p:txBody>
       </p:sp>
@@ -4131,12 +4045,8 @@
               <a:buNone/>
             </a:pPr>
             <a:r>
-              <a:rPr lang="en-US" dirty="0" smtClean="0"/>
-              <a:t>1. Open </a:t>
-            </a:r>
-            <a:r>
               <a:rPr lang="en-US" dirty="0"/>
-              <a:t>slice controls</a:t>
+              <a:t>1. Open slice controls</a:t>
             </a:r>
           </a:p>
         </p:txBody>
@@ -4643,7 +4553,7 @@
               <a:buNone/>
             </a:pPr>
             <a:r>
-              <a:rPr lang="en-US" dirty="0" smtClean="0"/>
+              <a:rPr lang="en-US" dirty="0"/>
               <a:t>4. Choose dose as foreground</a:t>
             </a:r>
           </a:p>
@@ -4652,10 +4562,9 @@
               <a:buNone/>
             </a:pPr>
             <a:r>
-              <a:rPr lang="en-US" dirty="0" smtClean="0"/>
+              <a:rPr lang="en-US" dirty="0"/>
               <a:t>5. Adjust foreground opacity</a:t>
             </a:r>
-            <a:endParaRPr lang="en-US" dirty="0"/>
           </a:p>
         </p:txBody>
       </p:sp>
@@ -4765,10 +4674,9 @@
           <a:lstStyle/>
           <a:p>
             <a:r>
-              <a:rPr lang="en-US" dirty="0" smtClean="0"/>
+              <a:rPr lang="en-US" dirty="0"/>
               <a:t>2/6. Tweak display</a:t>
             </a:r>
-            <a:endParaRPr lang="en-US" dirty="0"/>
           </a:p>
         </p:txBody>
       </p:sp>
@@ -4791,7 +4699,7 @@
               <a:defRPr/>
             </a:pPr>
             <a:r>
-              <a:rPr lang="en-US" smtClean="0"/>
+              <a:rPr lang="en-US"/>
               <a:t>- </a:t>
             </a:r>
             <a:fld id="{CF70E430-998E-4908-836F-E9BC2B613AC2}" type="slidenum">
@@ -4802,7 +4710,7 @@
               <a:t>14</a:t>
             </a:fld>
             <a:r>
-              <a:rPr lang="en-US" smtClean="0"/>
+              <a:rPr lang="en-US"/>
               <a:t> -</a:t>
             </a:r>
             <a:endParaRPr lang="en-US" dirty="0"/>
@@ -4828,7 +4736,7 @@
               <a:defRPr/>
             </a:pPr>
             <a:r>
-              <a:rPr lang="en-US" smtClean="0"/>
+              <a:rPr lang="en-US"/>
               <a:t>Laboratory for Percutaneous Surgery – Copyright © Queen’s University, 2019</a:t>
             </a:r>
             <a:endParaRPr lang="en-US" dirty="0"/>
@@ -4919,13 +4827,8 @@
           <a:p>
             <a:r>
               <a:rPr lang="en-US" dirty="0"/>
-              <a:t>1. </a:t>
-            </a:r>
-            <a:r>
-              <a:rPr lang="en-US" dirty="0"/>
-              <a:t>Reset 3D view</a:t>
-            </a:r>
-            <a:endParaRPr lang="en-US" dirty="0"/>
+              <a:t>1. Reset 3D view</a:t>
+            </a:r>
           </a:p>
         </p:txBody>
       </p:sp>
@@ -5002,7 +4905,6 @@
               <a:rPr lang="en-US" dirty="0"/>
               <a:t>Zoom with right button</a:t>
             </a:r>
-            <a:endParaRPr lang="en-US" dirty="0"/>
           </a:p>
         </p:txBody>
       </p:sp>
@@ -5066,7 +4968,7 @@
               <a:buChar char="•"/>
             </a:pPr>
             <a:r>
-              <a:rPr lang="en-US" dirty="0" smtClean="0"/>
+              <a:rPr lang="en-US" dirty="0"/>
               <a:t>Switch to W/L mode</a:t>
             </a:r>
           </a:p>
@@ -5076,16 +4978,12 @@
               <a:buChar char="•"/>
             </a:pPr>
             <a:r>
-              <a:rPr lang="en-US" dirty="0" err="1" smtClean="0"/>
+              <a:rPr lang="en-US" dirty="0" err="1"/>
               <a:t>Click&amp;drag</a:t>
             </a:r>
             <a:r>
-              <a:rPr lang="en-US" dirty="0" smtClean="0"/>
-              <a:t> </a:t>
-            </a:r>
-            <a:r>
               <a:rPr lang="en-US" dirty="0"/>
-              <a:t>left button</a:t>
+              <a:t> left button</a:t>
             </a:r>
           </a:p>
         </p:txBody>
@@ -5186,11 +5084,7 @@
             </a:r>
             <a:r>
               <a:rPr lang="en-US" sz="2000" dirty="0"/>
-              <a:t> on Mac</a:t>
-            </a:r>
-            <a:r>
-              <a:rPr lang="en-US" sz="2000" dirty="0" smtClean="0"/>
-              <a:t>)</a:t>
+              <a:t> on Mac)</a:t>
             </a:r>
           </a:p>
           <a:p>
@@ -5199,11 +5093,11 @@
               <a:buChar char="•"/>
             </a:pPr>
             <a:r>
-              <a:rPr lang="en-US" dirty="0" smtClean="0"/>
+              <a:rPr lang="en-US" dirty="0"/>
               <a:t>‘3D cursor’ by </a:t>
             </a:r>
             <a:r>
-              <a:rPr lang="en-US" dirty="0" err="1" smtClean="0"/>
+              <a:rPr lang="en-US" dirty="0" err="1"/>
               <a:t>Shift+Move</a:t>
             </a:r>
             <a:endParaRPr lang="en-US" sz="2800" dirty="0"/>
@@ -5293,10 +5187,9 @@
           <a:lstStyle/>
           <a:p>
             <a:r>
-              <a:rPr lang="en-US" sz="1050" dirty="0" smtClean="0"/>
+              <a:rPr lang="en-US" sz="1050" dirty="0"/>
               <a:t>1</a:t>
             </a:r>
-            <a:endParaRPr lang="en-US" sz="1050" dirty="0"/>
           </a:p>
         </p:txBody>
       </p:sp>
@@ -5383,10 +5276,9 @@
           <a:lstStyle/>
           <a:p>
             <a:r>
-              <a:rPr lang="en-US" sz="1050" dirty="0" smtClean="0"/>
+              <a:rPr lang="en-US" sz="1050" dirty="0"/>
               <a:t>3</a:t>
             </a:r>
-            <a:endParaRPr lang="en-US" sz="1050" dirty="0"/>
           </a:p>
         </p:txBody>
       </p:sp>
@@ -5476,7 +5368,6 @@
               <a:rPr lang="en-US" sz="1050" dirty="0"/>
               <a:t>3</a:t>
             </a:r>
-            <a:endParaRPr lang="en-US" sz="1050" dirty="0"/>
           </a:p>
         </p:txBody>
       </p:sp>
@@ -5563,10 +5454,9 @@
           <a:lstStyle/>
           <a:p>
             <a:r>
-              <a:rPr lang="en-US" sz="1050" dirty="0" smtClean="0"/>
+              <a:rPr lang="en-US" sz="1050" dirty="0"/>
               <a:t>2</a:t>
             </a:r>
-            <a:endParaRPr lang="en-US" sz="1050" dirty="0"/>
           </a:p>
         </p:txBody>
       </p:sp>
@@ -5653,10 +5543,9 @@
           <a:lstStyle/>
           <a:p>
             <a:r>
-              <a:rPr lang="en-US" sz="1050" dirty="0" smtClean="0"/>
+              <a:rPr lang="en-US" sz="1050" dirty="0"/>
               <a:t>4</a:t>
             </a:r>
-            <a:endParaRPr lang="en-US" sz="1050" dirty="0"/>
           </a:p>
         </p:txBody>
       </p:sp>
@@ -5706,10 +5595,9 @@
           <a:lstStyle/>
           <a:p>
             <a:r>
-              <a:rPr lang="en-US" dirty="0" smtClean="0"/>
+              <a:rPr lang="en-US" dirty="0"/>
               <a:t>2/7. Load day 2 data</a:t>
             </a:r>
-            <a:endParaRPr lang="en-US" dirty="0"/>
           </a:p>
         </p:txBody>
       </p:sp>
@@ -5732,7 +5620,7 @@
               <a:defRPr/>
             </a:pPr>
             <a:r>
-              <a:rPr lang="en-US" smtClean="0"/>
+              <a:rPr lang="en-US"/>
               <a:t>- </a:t>
             </a:r>
             <a:fld id="{CF70E430-998E-4908-836F-E9BC2B613AC2}" type="slidenum">
@@ -5743,7 +5631,7 @@
               <a:t>15</a:t>
             </a:fld>
             <a:r>
-              <a:rPr lang="en-US" smtClean="0"/>
+              <a:rPr lang="en-US"/>
               <a:t> -</a:t>
             </a:r>
             <a:endParaRPr lang="en-US" dirty="0"/>
@@ -5769,7 +5657,7 @@
               <a:defRPr/>
             </a:pPr>
             <a:r>
-              <a:rPr lang="en-US" smtClean="0"/>
+              <a:rPr lang="en-US"/>
               <a:t>Laboratory for Percutaneous Surgery – Copyright © Queen’s University, 2019</a:t>
             </a:r>
             <a:endParaRPr lang="en-US" dirty="0"/>
@@ -5860,28 +5748,23 @@
           </a:lstStyle>
           <a:p>
             <a:r>
-              <a:rPr lang="en-US" dirty="0" err="1" smtClean="0"/>
+              <a:rPr lang="en-US" dirty="0" err="1"/>
               <a:t>Drag&amp;drop</a:t>
             </a:r>
-            <a:r>
-              <a:rPr lang="en-US" dirty="0" smtClean="0"/>
-              <a:t/>
-            </a:r>
             <a:br>
-              <a:rPr lang="en-US" dirty="0" smtClean="0"/>
+              <a:rPr lang="en-US" dirty="0"/>
             </a:br>
             <a:r>
-              <a:rPr lang="en-US" dirty="0" smtClean="0"/>
+              <a:rPr lang="en-US" dirty="0"/>
               <a:t>‘2 ENT IMRT Day2.nrrd’ and</a:t>
             </a:r>
             <a:br>
-              <a:rPr lang="en-US" dirty="0" smtClean="0"/>
+              <a:rPr lang="en-US" dirty="0"/>
             </a:br>
             <a:r>
-              <a:rPr lang="en-US" dirty="0" smtClean="0"/>
+              <a:rPr lang="en-US" dirty="0"/>
               <a:t>‘5 RTDOSE Day2.nrrd’ onto Slicer</a:t>
             </a:r>
-            <a:endParaRPr lang="en-US" dirty="0"/>
           </a:p>
         </p:txBody>
       </p:sp>
@@ -6050,10 +5933,9 @@
           <a:lstStyle/>
           <a:p>
             <a:r>
-              <a:rPr lang="en-US" dirty="0" smtClean="0"/>
+              <a:rPr lang="en-US" dirty="0"/>
               <a:t>2/8. Add day 2 non-DICOM data to the same patient</a:t>
             </a:r>
-            <a:endParaRPr lang="en-US" dirty="0"/>
           </a:p>
         </p:txBody>
       </p:sp>
@@ -6076,7 +5958,7 @@
               <a:defRPr/>
             </a:pPr>
             <a:r>
-              <a:rPr lang="en-US" smtClean="0"/>
+              <a:rPr lang="en-US"/>
               <a:t>- </a:t>
             </a:r>
             <a:fld id="{CF70E430-998E-4908-836F-E9BC2B613AC2}" type="slidenum">
@@ -6087,7 +5969,7 @@
               <a:t>16</a:t>
             </a:fld>
             <a:r>
-              <a:rPr lang="en-US" smtClean="0"/>
+              <a:rPr lang="en-US"/>
               <a:t> -</a:t>
             </a:r>
             <a:endParaRPr lang="en-US" dirty="0"/>
@@ -6113,7 +5995,7 @@
               <a:defRPr/>
             </a:pPr>
             <a:r>
-              <a:rPr lang="en-US" smtClean="0"/>
+              <a:rPr lang="en-US"/>
               <a:t>Laboratory for Percutaneous Surgery – Copyright © Queen’s University, 2019</a:t>
             </a:r>
             <a:endParaRPr lang="en-US" dirty="0"/>
@@ -6205,13 +6087,8 @@
           <a:p>
             <a:r>
               <a:rPr lang="en-US" dirty="0"/>
-              <a:t>1. </a:t>
-            </a:r>
-            <a:r>
-              <a:rPr lang="en-US" dirty="0"/>
-              <a:t>Right-click the patient</a:t>
-            </a:r>
-            <a:endParaRPr lang="en-US" dirty="0"/>
+              <a:t>1. Right-click the patient</a:t>
+            </a:r>
           </a:p>
         </p:txBody>
       </p:sp>
@@ -6268,7 +6145,6 @@
               <a:rPr lang="en-US" dirty="0"/>
               <a:t>2. Create child study</a:t>
             </a:r>
-            <a:endParaRPr lang="en-US" dirty="0"/>
           </a:p>
         </p:txBody>
       </p:sp>
@@ -6323,28 +6199,14 @@
           <a:p>
             <a:r>
               <a:rPr lang="en-US" dirty="0"/>
-              <a:t>3. </a:t>
-            </a:r>
-            <a:r>
-              <a:rPr lang="en-US" dirty="0" smtClean="0"/>
-              <a:t>Double-click </a:t>
-            </a:r>
-            <a:r>
-              <a:rPr lang="en-US" dirty="0"/>
-              <a:t>new </a:t>
-            </a:r>
-            <a:r>
-              <a:rPr lang="en-US" dirty="0" smtClean="0"/>
-              <a:t>study</a:t>
-            </a:r>
-            <a:endParaRPr lang="en-US" dirty="0"/>
+              <a:t>3. Double-click new study</a:t>
+            </a:r>
           </a:p>
           <a:p>
             <a:r>
               <a:rPr lang="en-US" dirty="0"/>
               <a:t>4. Rename to ‘Day 2’</a:t>
             </a:r>
-            <a:endParaRPr lang="en-US" dirty="0"/>
           </a:p>
         </p:txBody>
       </p:sp>
@@ -6398,10 +6260,9 @@
           </a:lstStyle>
           <a:p>
             <a:r>
-              <a:rPr lang="en-US" dirty="0" smtClean="0"/>
+              <a:rPr lang="en-US" dirty="0"/>
               <a:t>Note: You may want to minimize Data Probe to see more of the data tree</a:t>
             </a:r>
-            <a:endParaRPr lang="en-US" dirty="0"/>
           </a:p>
         </p:txBody>
       </p:sp>
@@ -6610,10 +6471,9 @@
           <a:lstStyle/>
           <a:p>
             <a:r>
-              <a:rPr lang="en-US" dirty="0" smtClean="0"/>
+              <a:rPr lang="en-US" dirty="0"/>
               <a:t>2/9. Add day 2 non-DICOM data to the same patient</a:t>
             </a:r>
-            <a:endParaRPr lang="en-US" dirty="0"/>
           </a:p>
         </p:txBody>
       </p:sp>
@@ -6636,7 +6496,7 @@
               <a:defRPr/>
             </a:pPr>
             <a:r>
-              <a:rPr lang="en-US" smtClean="0"/>
+              <a:rPr lang="en-US"/>
               <a:t>- </a:t>
             </a:r>
             <a:fld id="{CF70E430-998E-4908-836F-E9BC2B613AC2}" type="slidenum">
@@ -6647,7 +6507,7 @@
               <a:t>17</a:t>
             </a:fld>
             <a:r>
-              <a:rPr lang="en-US" smtClean="0"/>
+              <a:rPr lang="en-US"/>
               <a:t> -</a:t>
             </a:r>
             <a:endParaRPr lang="en-US" dirty="0"/>
@@ -6673,7 +6533,7 @@
               <a:defRPr/>
             </a:pPr>
             <a:r>
-              <a:rPr lang="en-US" smtClean="0"/>
+              <a:rPr lang="en-US"/>
               <a:t>Laboratory for Percutaneous Surgery – Copyright © Queen’s University, 2019</a:t>
             </a:r>
             <a:endParaRPr lang="en-US" dirty="0"/>
@@ -6730,37 +6590,36 @@
           </a:lstStyle>
           <a:p>
             <a:r>
-              <a:rPr lang="en-US" dirty="0" smtClean="0"/>
+              <a:rPr lang="en-US" dirty="0"/>
               <a:t>1. Select day 2 CT and dose with </a:t>
             </a:r>
             <a:r>
-              <a:rPr lang="en-US" dirty="0" err="1" smtClean="0"/>
+              <a:rPr lang="en-US" dirty="0" err="1"/>
               <a:t>Ctrl+click</a:t>
             </a:r>
             <a:r>
-              <a:rPr lang="en-US" dirty="0" smtClean="0"/>
+              <a:rPr lang="en-US" dirty="0"/>
               <a:t> or </a:t>
             </a:r>
             <a:r>
-              <a:rPr lang="en-US" dirty="0" err="1" smtClean="0"/>
+              <a:rPr lang="en-US" dirty="0" err="1"/>
               <a:t>Shift+click</a:t>
             </a:r>
-            <a:endParaRPr lang="en-US" dirty="0" smtClean="0"/>
-          </a:p>
-          <a:p>
-            <a:r>
-              <a:rPr lang="en-US" dirty="0" smtClean="0"/>
+            <a:endParaRPr lang="en-US" dirty="0"/>
+          </a:p>
+          <a:p>
+            <a:r>
+              <a:rPr lang="en-US" dirty="0"/>
               <a:t>2. </a:t>
             </a:r>
             <a:r>
-              <a:rPr lang="en-US" dirty="0" err="1" smtClean="0"/>
+              <a:rPr lang="en-US" dirty="0" err="1"/>
               <a:t>Drag&amp;drop</a:t>
             </a:r>
             <a:r>
-              <a:rPr lang="en-US" dirty="0" smtClean="0"/>
+              <a:rPr lang="en-US" dirty="0"/>
               <a:t> on new study</a:t>
             </a:r>
-            <a:endParaRPr lang="en-US" dirty="0"/>
           </a:p>
         </p:txBody>
       </p:sp>
@@ -6969,10 +6828,9 @@
           <a:lstStyle/>
           <a:p>
             <a:r>
-              <a:rPr lang="en-US" dirty="0" smtClean="0"/>
+              <a:rPr lang="en-US" dirty="0"/>
               <a:t>2/10. Convert day 2 dose image to an actual dose volume</a:t>
             </a:r>
-            <a:endParaRPr lang="en-US" dirty="0"/>
           </a:p>
         </p:txBody>
       </p:sp>
@@ -6995,7 +6853,7 @@
               <a:defRPr/>
             </a:pPr>
             <a:r>
-              <a:rPr lang="en-US" smtClean="0"/>
+              <a:rPr lang="en-US"/>
               <a:t>- </a:t>
             </a:r>
             <a:fld id="{CF70E430-998E-4908-836F-E9BC2B613AC2}" type="slidenum">
@@ -7006,7 +6864,7 @@
               <a:t>18</a:t>
             </a:fld>
             <a:r>
-              <a:rPr lang="en-US" smtClean="0"/>
+              <a:rPr lang="en-US"/>
               <a:t> -</a:t>
             </a:r>
             <a:endParaRPr lang="en-US" dirty="0"/>
@@ -7032,7 +6890,7 @@
               <a:defRPr/>
             </a:pPr>
             <a:r>
-              <a:rPr lang="en-US" smtClean="0"/>
+              <a:rPr lang="en-US"/>
               <a:t>Laboratory for Percutaneous Surgery – Copyright © Queen’s University, 2019</a:t>
             </a:r>
             <a:endParaRPr lang="en-US" dirty="0"/>
@@ -7660,7 +7518,7 @@
               <a:defRPr/>
             </a:pPr>
             <a:r>
-              <a:rPr lang="en-US" smtClean="0"/>
+              <a:rPr lang="en-US"/>
               <a:t>- </a:t>
             </a:r>
             <a:fld id="{CF70E430-998E-4908-836F-E9BC2B613AC2}" type="slidenum">
@@ -7671,7 +7529,7 @@
               <a:t>19</a:t>
             </a:fld>
             <a:r>
-              <a:rPr lang="en-US" smtClean="0"/>
+              <a:rPr lang="en-US"/>
               <a:t> -</a:t>
             </a:r>
             <a:endParaRPr lang="en-US" dirty="0"/>
@@ -7697,10 +7555,9 @@
               <a:defRPr/>
             </a:pPr>
             <a:r>
-              <a:rPr lang="en-US" dirty="0" smtClean="0"/>
+              <a:rPr lang="en-US" dirty="0"/>
               <a:t>Laboratory for Percutaneous Surgery – Copyright © Queen’s University, 2015</a:t>
             </a:r>
-            <a:endParaRPr lang="en-US" dirty="0"/>
           </a:p>
         </p:txBody>
       </p:sp>
@@ -7815,7 +7672,6 @@
               <a:rPr lang="en-CA" dirty="0"/>
               <a:t>3/1. Register CT volumes</a:t>
             </a:r>
-            <a:endParaRPr lang="en-CA" dirty="0"/>
           </a:p>
         </p:txBody>
       </p:sp>
@@ -7992,75 +7848,34 @@
             </a:br>
             <a:r>
               <a:rPr lang="en-US" dirty="0"/>
-              <a:t>2. </a:t>
-            </a:r>
-            <a:r>
-              <a:rPr lang="en-US" dirty="0"/>
-              <a:t>Choose ‘2: </a:t>
-            </a:r>
-            <a:r>
-              <a:rPr lang="en-US" dirty="0" smtClean="0"/>
-              <a:t>ENT IMRT</a:t>
-            </a:r>
-            <a:r>
-              <a:rPr lang="en-US" dirty="0"/>
-              <a:t>’ as</a:t>
+              <a:t>2. Choose ‘2: ENT IMRT’ as</a:t>
             </a:r>
             <a:br>
               <a:rPr lang="en-US" dirty="0"/>
             </a:br>
             <a:r>
               <a:rPr lang="en-US" dirty="0"/>
-              <a:t>fixed </a:t>
-            </a:r>
-            <a:r>
-              <a:rPr lang="en-US" dirty="0"/>
-              <a:t>image</a:t>
+              <a:t>fixed image</a:t>
             </a:r>
             <a:br>
               <a:rPr lang="en-US" dirty="0"/>
             </a:br>
             <a:r>
               <a:rPr lang="en-US" dirty="0"/>
-              <a:t>3. Choose day 2 CT </a:t>
-            </a:r>
+              <a:t>3. Choose day 2 CT ‘2 ENT </a:t>
+            </a:r>
+          </a:p>
+          <a:p>
             <a:r>
               <a:rPr lang="en-US" dirty="0"/>
-              <a:t>‘</a:t>
-            </a:r>
-            <a:r>
-              <a:rPr lang="en-US" dirty="0" smtClean="0"/>
-              <a:t>2 ENT </a:t>
-            </a:r>
-            <a:endParaRPr lang="en-US" dirty="0"/>
-          </a:p>
-          <a:p>
-            <a:r>
-              <a:rPr lang="en-US" dirty="0" smtClean="0"/>
-              <a:t>IMRT Day2</a:t>
-            </a:r>
-            <a:r>
-              <a:rPr lang="en-US" dirty="0"/>
-              <a:t>’ as moving </a:t>
-            </a:r>
-            <a:r>
-              <a:rPr lang="en-US" dirty="0"/>
-              <a:t>image</a:t>
+              <a:t>IMRT Day2’ as moving image</a:t>
             </a:r>
             <a:br>
               <a:rPr lang="en-US" dirty="0"/>
             </a:br>
             <a:r>
               <a:rPr lang="en-US" dirty="0"/>
-              <a:t>4. </a:t>
-            </a:r>
-            <a:r>
-              <a:rPr lang="en-US" dirty="0"/>
-              <a:t>Create </a:t>
-            </a:r>
-            <a:r>
-              <a:rPr lang="en-US" dirty="0"/>
-              <a:t>linear transform</a:t>
+              <a:t>4. Create linear transform</a:t>
             </a:r>
           </a:p>
           <a:p>
@@ -8073,23 +7888,14 @@
             <a:r>
               <a:rPr lang="en-US" dirty="0"/>
               <a:t>Transform_Day2ToDay1_Rigid</a:t>
-            </a:r>
-            <a:r>
-              <a:rPr lang="en-US" dirty="0"/>
-              <a:t/>
             </a:r>
             <a:br>
               <a:rPr lang="en-US" dirty="0"/>
             </a:br>
             <a:r>
               <a:rPr lang="en-US" dirty="0"/>
-              <a:t>5. Choose ‘Rigid (6 DOF</a:t>
-            </a:r>
-            <a:r>
-              <a:rPr lang="en-US" dirty="0"/>
-              <a:t>)’</a:t>
-            </a:r>
-            <a:endParaRPr lang="en-US" dirty="0"/>
+              <a:t>5. Choose ‘Rigid (6 DOF)’</a:t>
+            </a:r>
           </a:p>
         </p:txBody>
       </p:sp>
@@ -8513,13 +8319,6 @@
   <p:clrMapOvr>
     <a:masterClrMapping/>
   </p:clrMapOvr>
-  <p:timing>
-    <p:tnLst>
-      <p:par>
-        <p:cTn id="1" dur="indefinite" restart="never" nodeType="tmRoot"/>
-      </p:par>
-    </p:tnLst>
-  </p:timing>
 </p:sld>
 </file>
 
@@ -8589,10 +8388,9 @@
           <a:lstStyle/>
           <a:p>
             <a:r>
-              <a:rPr lang="en-US" dirty="0" smtClean="0"/>
+              <a:rPr lang="en-US" dirty="0"/>
               <a:t>Learning objective</a:t>
             </a:r>
-            <a:endParaRPr lang="en-US" dirty="0"/>
           </a:p>
         </p:txBody>
       </p:sp>
@@ -8615,7 +8413,7 @@
               <a:defRPr/>
             </a:pPr>
             <a:r>
-              <a:rPr lang="en-US" smtClean="0"/>
+              <a:rPr lang="en-US"/>
               <a:t>- </a:t>
             </a:r>
             <a:fld id="{CF70E430-998E-4908-836F-E9BC2B613AC2}" type="slidenum">
@@ -8626,7 +8424,7 @@
               <a:t>2</a:t>
             </a:fld>
             <a:r>
-              <a:rPr lang="en-US" smtClean="0"/>
+              <a:rPr lang="en-US"/>
               <a:t> -</a:t>
             </a:r>
             <a:endParaRPr lang="en-US" dirty="0"/>
@@ -8652,7 +8450,7 @@
               <a:defRPr/>
             </a:pPr>
             <a:r>
-              <a:rPr lang="en-US" smtClean="0"/>
+              <a:rPr lang="en-US"/>
               <a:t>Laboratory for Percutaneous Surgery – Copyright © Queen’s University, 2019</a:t>
             </a:r>
             <a:endParaRPr lang="en-US" dirty="0"/>
@@ -9048,43 +8846,7 @@
                 </a:solidFill>
                 <a:latin typeface="+mn-lt"/>
               </a:rPr>
-              <a:t>This tutorial demonstrates how to perform a </a:t>
-            </a:r>
-            <a:r>
-              <a:rPr lang="en-US" altLang="en-US" sz="3200" dirty="0" smtClean="0">
-                <a:solidFill>
-                  <a:srgbClr val="000000"/>
-                </a:solidFill>
-                <a:latin typeface="+mn-lt"/>
-              </a:rPr>
-              <a:t>full radiation </a:t>
-            </a:r>
-            <a:r>
-              <a:rPr lang="en-US" altLang="en-US" sz="3200" dirty="0">
-                <a:solidFill>
-                  <a:srgbClr val="000000"/>
-                </a:solidFill>
-                <a:latin typeface="+mn-lt"/>
-              </a:rPr>
-              <a:t>therapy </a:t>
-            </a:r>
-            <a:r>
-              <a:rPr lang="en-US" altLang="en-US" sz="3200" dirty="0" smtClean="0">
-                <a:solidFill>
-                  <a:srgbClr val="000000"/>
-                </a:solidFill>
-                <a:latin typeface="+mn-lt"/>
-              </a:rPr>
-              <a:t>workflow </a:t>
-            </a:r>
-            <a:r>
-              <a:rPr lang="en-US" altLang="en-US" sz="3200" dirty="0">
-                <a:solidFill>
-                  <a:srgbClr val="000000"/>
-                </a:solidFill>
-                <a:latin typeface="+mn-lt"/>
-              </a:rPr>
-              <a:t>using the SlicerRT toolkit:</a:t>
+              <a:t>This tutorial demonstrates how to perform a full radiation therapy workflow using the SlicerRT toolkit:</a:t>
             </a:r>
             <a:br>
               <a:rPr lang="en-US" altLang="en-US" sz="3200" dirty="0">
@@ -9108,7 +8870,7 @@
               </a:spcBef>
             </a:pPr>
             <a:r>
-              <a:rPr lang="en-US" altLang="en-US" sz="3200" dirty="0" smtClean="0">
+              <a:rPr lang="en-US" altLang="en-US" sz="3200" dirty="0">
                 <a:solidFill>
                   <a:srgbClr val="000000"/>
                 </a:solidFill>
@@ -9117,7 +8879,7 @@
               <a:t>Image-guided RT using </a:t>
             </a:r>
             <a:r>
-              <a:rPr lang="en-US" altLang="en-US" sz="3200" dirty="0" err="1" smtClean="0">
+              <a:rPr lang="en-US" altLang="en-US" sz="3200" dirty="0" err="1">
                 <a:solidFill>
                   <a:srgbClr val="000000"/>
                 </a:solidFill>
@@ -9126,7 +8888,7 @@
               <a:t>isocenter</a:t>
             </a:r>
             <a:r>
-              <a:rPr lang="en-US" altLang="en-US" sz="3200" dirty="0" smtClean="0">
+              <a:rPr lang="en-US" altLang="en-US" sz="3200" dirty="0">
                 <a:solidFill>
                   <a:srgbClr val="000000"/>
                 </a:solidFill>
@@ -9134,12 +8896,6 @@
               </a:rPr>
               <a:t> shifting technique</a:t>
             </a:r>
-            <a:endParaRPr lang="en-US" altLang="en-US" sz="3200" dirty="0">
-              <a:solidFill>
-                <a:srgbClr val="000000"/>
-              </a:solidFill>
-              <a:latin typeface="+mn-lt"/>
-            </a:endParaRPr>
           </a:p>
         </p:txBody>
       </p:sp>
@@ -9403,7 +9159,7 @@
               <a:defRPr/>
             </a:pPr>
             <a:r>
-              <a:rPr lang="en-US" smtClean="0"/>
+              <a:rPr lang="en-US"/>
               <a:t>- </a:t>
             </a:r>
             <a:fld id="{CF70E430-998E-4908-836F-E9BC2B613AC2}" type="slidenum">
@@ -9414,7 +9170,7 @@
               <a:t>20</a:t>
             </a:fld>
             <a:r>
-              <a:rPr lang="en-US" smtClean="0"/>
+              <a:rPr lang="en-US"/>
               <a:t> -</a:t>
             </a:r>
             <a:endParaRPr lang="en-US" dirty="0"/>
@@ -9440,10 +9196,9 @@
               <a:defRPr/>
             </a:pPr>
             <a:r>
-              <a:rPr lang="en-US" dirty="0" smtClean="0"/>
+              <a:rPr lang="en-US" dirty="0"/>
               <a:t>Laboratory for Percutaneous Surgery – Copyright © Queen’s University, 2015</a:t>
             </a:r>
-            <a:endParaRPr lang="en-US" dirty="0"/>
           </a:p>
         </p:txBody>
       </p:sp>
@@ -9558,10 +9313,9 @@
           </a:lstStyle>
           <a:p>
             <a:r>
-              <a:rPr lang="en-CA" dirty="0" smtClean="0"/>
+              <a:rPr lang="en-CA" dirty="0"/>
               <a:t>3/1A. Alternative registration</a:t>
             </a:r>
-            <a:endParaRPr lang="en-CA" dirty="0"/>
           </a:p>
         </p:txBody>
       </p:sp>
@@ -9752,10 +9506,9 @@
               <a:buNone/>
             </a:pPr>
             <a:r>
-              <a:rPr lang="en-CA" dirty="0" smtClean="0"/>
+              <a:rPr lang="en-CA" dirty="0"/>
               <a:t>You can also initiate registration from subject hierarchy (alternative way for previous step):</a:t>
             </a:r>
-            <a:endParaRPr lang="en-CA" dirty="0"/>
           </a:p>
         </p:txBody>
       </p:sp>
@@ -10146,13 +9899,6 @@
   <p:clrMapOvr>
     <a:masterClrMapping/>
   </p:clrMapOvr>
-  <p:timing>
-    <p:tnLst>
-      <p:par>
-        <p:cTn id="1" dur="indefinite" restart="never" nodeType="tmRoot"/>
-      </p:par>
-    </p:tnLst>
-  </p:timing>
 </p:sld>
 </file>
 
@@ -10223,10 +9969,9 @@
           <a:lstStyle/>
           <a:p>
             <a:r>
-              <a:rPr lang="en-US" dirty="0" smtClean="0"/>
+              <a:rPr lang="en-US" dirty="0"/>
               <a:t>3/2. Explore registration result</a:t>
             </a:r>
-            <a:endParaRPr lang="en-US" dirty="0"/>
           </a:p>
         </p:txBody>
       </p:sp>
@@ -10249,7 +9994,7 @@
               <a:defRPr/>
             </a:pPr>
             <a:r>
-              <a:rPr lang="en-US" smtClean="0"/>
+              <a:rPr lang="en-US"/>
               <a:t>- </a:t>
             </a:r>
             <a:fld id="{CF70E430-998E-4908-836F-E9BC2B613AC2}" type="slidenum">
@@ -10260,7 +10005,7 @@
               <a:t>21</a:t>
             </a:fld>
             <a:r>
-              <a:rPr lang="en-US" smtClean="0"/>
+              <a:rPr lang="en-US"/>
               <a:t> -</a:t>
             </a:r>
             <a:endParaRPr lang="en-US" dirty="0"/>
@@ -10286,7 +10031,7 @@
               <a:defRPr/>
             </a:pPr>
             <a:r>
-              <a:rPr lang="en-US" smtClean="0"/>
+              <a:rPr lang="en-US"/>
               <a:t>Laboratory for Percutaneous Surgery – Copyright © Queen’s University, 2019</a:t>
             </a:r>
             <a:endParaRPr lang="en-US" dirty="0"/>
@@ -10663,37 +10408,36 @@
           </a:lstStyle>
           <a:p>
             <a:r>
-              <a:rPr lang="en-US" dirty="0" smtClean="0"/>
+              <a:rPr lang="en-US" dirty="0"/>
               <a:t>1. Show both volumes as previously shown</a:t>
             </a:r>
           </a:p>
           <a:p>
             <a:r>
-              <a:rPr lang="en-US" dirty="0" smtClean="0"/>
+              <a:rPr lang="en-US" dirty="0"/>
               <a:t>2. Set color table and/or window/level presets in Volumes module</a:t>
             </a:r>
           </a:p>
           <a:p>
             <a:r>
-              <a:rPr lang="en-US" dirty="0" smtClean="0"/>
+              <a:rPr lang="en-US" dirty="0"/>
               <a:t>3. Change opacity to see differences</a:t>
             </a:r>
             <a:br>
-              <a:rPr lang="en-US" dirty="0" smtClean="0"/>
+              <a:rPr lang="en-US" dirty="0"/>
             </a:br>
             <a:r>
-              <a:rPr lang="en-US" dirty="0" smtClean="0"/>
+              <a:rPr lang="en-US" dirty="0"/>
               <a:t>Hint: </a:t>
             </a:r>
             <a:r>
-              <a:rPr lang="en-US" dirty="0" err="1" smtClean="0"/>
+              <a:rPr lang="en-US" dirty="0" err="1"/>
               <a:t>Ctrl+drag</a:t>
             </a:r>
             <a:r>
-              <a:rPr lang="en-US" dirty="0" smtClean="0"/>
+              <a:rPr lang="en-US" dirty="0"/>
               <a:t> up/down also changes opacity</a:t>
             </a:r>
-            <a:endParaRPr lang="en-US" dirty="0"/>
           </a:p>
         </p:txBody>
       </p:sp>
@@ -10780,7 +10524,7 @@
               <a:defRPr/>
             </a:pPr>
             <a:r>
-              <a:rPr lang="en-US" smtClean="0"/>
+              <a:rPr lang="en-US"/>
               <a:t>- </a:t>
             </a:r>
             <a:fld id="{CF70E430-998E-4908-836F-E9BC2B613AC2}" type="slidenum">
@@ -10791,7 +10535,7 @@
               <a:t>22</a:t>
             </a:fld>
             <a:r>
-              <a:rPr lang="en-US" smtClean="0"/>
+              <a:rPr lang="en-US"/>
               <a:t> -</a:t>
             </a:r>
             <a:endParaRPr lang="en-US" dirty="0"/>
@@ -10817,10 +10561,9 @@
               <a:defRPr/>
             </a:pPr>
             <a:r>
-              <a:rPr lang="en-US" dirty="0" smtClean="0"/>
+              <a:rPr lang="en-US" dirty="0"/>
               <a:t>Laboratory for Percutaneous Surgery – Copyright © Queen’s University, 2015</a:t>
             </a:r>
-            <a:endParaRPr lang="en-US" dirty="0"/>
           </a:p>
         </p:txBody>
       </p:sp>
@@ -10933,21 +10676,8 @@
           <a:p>
             <a:r>
               <a:rPr lang="en-CA" dirty="0"/>
-              <a:t>4/1. </a:t>
-            </a:r>
-            <a:r>
-              <a:rPr lang="en-CA" dirty="0"/>
-              <a:t>Clone </a:t>
-            </a:r>
-            <a:r>
-              <a:rPr lang="en-CA" dirty="0" smtClean="0"/>
-              <a:t>day 2 dose </a:t>
-            </a:r>
-            <a:r>
-              <a:rPr lang="en-CA" dirty="0"/>
-              <a:t>volume</a:t>
-            </a:r>
-            <a:endParaRPr lang="en-CA" dirty="0"/>
+              <a:t>4/1. Clone day 2 dose volume</a:t>
+            </a:r>
           </a:p>
         </p:txBody>
       </p:sp>
@@ -11066,53 +10796,20 @@
           <a:p>
             <a:r>
               <a:rPr lang="en-US" dirty="0"/>
-              <a:t>1. </a:t>
-            </a:r>
+              <a:t>1. Switch to Data module / subject hierarchy</a:t>
+            </a:r>
+          </a:p>
+          <a:p>
             <a:r>
               <a:rPr lang="en-US" dirty="0"/>
-              <a:t>Switch to </a:t>
-            </a:r>
-            <a:r>
-              <a:rPr lang="en-US" dirty="0" smtClean="0"/>
-              <a:t>Data module / subject </a:t>
-            </a:r>
+              <a:t>2. Select ‘Clone node’ in context menu for day 2 dose</a:t>
+            </a:r>
+          </a:p>
+          <a:p>
             <a:r>
               <a:rPr lang="en-US" dirty="0"/>
-              <a:t>hierarchy</a:t>
-            </a:r>
-          </a:p>
-          <a:p>
-            <a:r>
-              <a:rPr lang="en-US" dirty="0"/>
-              <a:t>2. Select </a:t>
-            </a:r>
-            <a:r>
-              <a:rPr lang="en-US" dirty="0"/>
-              <a:t>‘Clone node’ in context menu for day 2 </a:t>
-            </a:r>
-            <a:r>
-              <a:rPr lang="en-US" dirty="0"/>
-              <a:t>dose</a:t>
-            </a:r>
-          </a:p>
-          <a:p>
-            <a:r>
-              <a:rPr lang="en-US" dirty="0"/>
-              <a:t>3. </a:t>
-            </a:r>
-            <a:r>
-              <a:rPr lang="en-US" dirty="0"/>
-              <a:t>Rename it to ‘</a:t>
-            </a:r>
-            <a:r>
-              <a:rPr lang="en-US" dirty="0" smtClean="0"/>
-              <a:t>5 RTDOSE Day2 </a:t>
-            </a:r>
-            <a:r>
-              <a:rPr lang="en-US" dirty="0"/>
-              <a:t>Rigid’</a:t>
-            </a:r>
-            <a:endParaRPr lang="en-US" dirty="0"/>
+              <a:t>3. Rename it to ‘5 RTDOSE Day2 Rigid’</a:t>
+            </a:r>
           </a:p>
         </p:txBody>
       </p:sp>
@@ -11303,44 +11000,31 @@
               <a:buNone/>
             </a:pPr>
             <a:r>
-              <a:rPr lang="en-CA" dirty="0" smtClean="0"/>
-              <a:t>To be able to compare the </a:t>
-            </a:r>
-            <a:r>
-              <a:rPr lang="en-CA" dirty="0" smtClean="0"/>
-              <a:t>non-registered</a:t>
+              <a:rPr lang="en-CA" dirty="0"/>
+              <a:t>To be able to compare the non-registered</a:t>
             </a:r>
             <a:br>
-              <a:rPr lang="en-CA" dirty="0" smtClean="0"/>
+              <a:rPr lang="en-CA" dirty="0"/>
             </a:br>
             <a:r>
-              <a:rPr lang="en-CA" dirty="0" smtClean="0"/>
+              <a:rPr lang="en-CA" dirty="0"/>
+              <a:t>(= uncorrected) and the registered</a:t>
+            </a:r>
+            <a:br>
+              <a:rPr lang="en-CA" dirty="0"/>
+            </a:br>
+            <a:r>
+              <a:rPr lang="en-CA" dirty="0"/>
               <a:t>(= </a:t>
             </a:r>
             <a:r>
-              <a:rPr lang="en-CA" dirty="0" smtClean="0"/>
-              <a:t>uncorrected) and the </a:t>
-            </a:r>
-            <a:r>
-              <a:rPr lang="en-CA" dirty="0" smtClean="0"/>
-              <a:t>registered</a:t>
-            </a:r>
-            <a:br>
-              <a:rPr lang="en-CA" dirty="0" smtClean="0"/>
-            </a:br>
-            <a:r>
-              <a:rPr lang="en-CA" dirty="0" smtClean="0"/>
-              <a:t>(= </a:t>
-            </a:r>
-            <a:r>
-              <a:rPr lang="en-CA" dirty="0" err="1" smtClean="0"/>
+              <a:rPr lang="en-CA" dirty="0" err="1"/>
               <a:t>isocenter</a:t>
             </a:r>
             <a:r>
-              <a:rPr lang="en-CA" dirty="0" smtClean="0"/>
+              <a:rPr lang="en-CA" dirty="0"/>
               <a:t> shifted) results.</a:t>
             </a:r>
-            <a:endParaRPr lang="en-CA" dirty="0"/>
           </a:p>
         </p:txBody>
       </p:sp>
@@ -11354,13 +11038,6 @@
   <p:clrMapOvr>
     <a:masterClrMapping/>
   </p:clrMapOvr>
-  <p:timing>
-    <p:tnLst>
-      <p:par>
-        <p:cTn id="1" dur="indefinite" restart="never" nodeType="tmRoot"/>
-      </p:par>
-    </p:tnLst>
-  </p:timing>
 </p:sld>
 </file>
 
@@ -11468,7 +11145,7 @@
               <a:defRPr/>
             </a:pPr>
             <a:r>
-              <a:rPr lang="en-US" smtClean="0"/>
+              <a:rPr lang="en-US"/>
               <a:t>- </a:t>
             </a:r>
             <a:fld id="{CF70E430-998E-4908-836F-E9BC2B613AC2}" type="slidenum">
@@ -11479,7 +11156,7 @@
               <a:t>23</a:t>
             </a:fld>
             <a:r>
-              <a:rPr lang="en-US" smtClean="0"/>
+              <a:rPr lang="en-US"/>
               <a:t> -</a:t>
             </a:r>
             <a:endParaRPr lang="en-US" dirty="0"/>
@@ -11505,10 +11182,9 @@
               <a:defRPr/>
             </a:pPr>
             <a:r>
-              <a:rPr lang="en-US" dirty="0" smtClean="0"/>
+              <a:rPr lang="en-US" dirty="0"/>
               <a:t>Laboratory for Percutaneous Surgery – Copyright © Queen’s University, 2015</a:t>
             </a:r>
-            <a:endParaRPr lang="en-US" dirty="0"/>
           </a:p>
         </p:txBody>
       </p:sp>
@@ -11626,7 +11302,6 @@
               <a:rPr lang="en-CA" dirty="0"/>
               <a:t>4/2. Transform cloned dose volume</a:t>
             </a:r>
-            <a:endParaRPr lang="en-CA" dirty="0"/>
           </a:p>
         </p:txBody>
       </p:sp>
@@ -11680,12 +11355,8 @@
           </a:lstStyle>
           <a:p>
             <a:r>
-              <a:rPr lang="en-US" dirty="0" smtClean="0"/>
-              <a:t>Double-click </a:t>
-            </a:r>
-            <a:r>
               <a:rPr lang="en-US" dirty="0"/>
-              <a:t>transform</a:t>
+              <a:t>Double-click transform</a:t>
             </a:r>
             <a:br>
               <a:rPr lang="en-US" dirty="0"/>
@@ -11694,7 +11365,6 @@
               <a:rPr lang="en-US" dirty="0"/>
               <a:t>column of cloned dose</a:t>
             </a:r>
-            <a:endParaRPr lang="en-US" dirty="0"/>
           </a:p>
         </p:txBody>
       </p:sp>
@@ -11889,13 +11559,6 @@
   <p:clrMapOvr>
     <a:masterClrMapping/>
   </p:clrMapOvr>
-  <p:timing>
-    <p:tnLst>
-      <p:par>
-        <p:cTn id="1" dur="indefinite" restart="never" nodeType="tmRoot"/>
-      </p:par>
-    </p:tnLst>
-  </p:timing>
 </p:sld>
 </file>
 
@@ -12003,7 +11666,7 @@
               <a:defRPr/>
             </a:pPr>
             <a:r>
-              <a:rPr lang="en-US" smtClean="0"/>
+              <a:rPr lang="en-US"/>
               <a:t>- </a:t>
             </a:r>
             <a:fld id="{CF70E430-998E-4908-836F-E9BC2B613AC2}" type="slidenum">
@@ -12014,7 +11677,7 @@
               <a:t>24</a:t>
             </a:fld>
             <a:r>
-              <a:rPr lang="en-US" smtClean="0"/>
+              <a:rPr lang="en-US"/>
               <a:t> -</a:t>
             </a:r>
             <a:endParaRPr lang="en-US" dirty="0"/>
@@ -12040,10 +11703,9 @@
               <a:defRPr/>
             </a:pPr>
             <a:r>
-              <a:rPr lang="en-US" dirty="0" smtClean="0"/>
+              <a:rPr lang="en-US" dirty="0"/>
               <a:t>Laboratory for Percutaneous Surgery – Copyright © Queen’s University, 2015</a:t>
             </a:r>
-            <a:endParaRPr lang="en-US" dirty="0"/>
           </a:p>
         </p:txBody>
       </p:sp>
@@ -12161,7 +11823,6 @@
               <a:rPr lang="en-CA" dirty="0"/>
               <a:t>5/1. Accumulate dose distributions</a:t>
             </a:r>
-            <a:endParaRPr lang="en-CA" dirty="0"/>
           </a:p>
         </p:txBody>
       </p:sp>
@@ -12471,41 +12132,21 @@
           <a:p>
             <a:r>
               <a:rPr lang="en-US" dirty="0"/>
-              <a:t>2. </a:t>
-            </a:r>
-            <a:r>
-              <a:rPr lang="en-US" dirty="0"/>
-              <a:t>Choose </a:t>
-            </a:r>
-            <a:r>
-              <a:rPr lang="en-US" dirty="0"/>
-              <a:t>reference,</a:t>
+              <a:t>2. Choose reference,</a:t>
             </a:r>
             <a:br>
               <a:rPr lang="en-US" dirty="0"/>
             </a:br>
             <a:r>
               <a:rPr lang="en-US" dirty="0"/>
-              <a:t>then planning </a:t>
-            </a:r>
-            <a:r>
-              <a:rPr lang="en-US" dirty="0"/>
-              <a:t>and day </a:t>
-            </a:r>
-            <a:r>
-              <a:rPr lang="en-US" dirty="0"/>
-              <a:t>2</a:t>
+              <a:t>then planning and day 2</a:t>
             </a:r>
             <a:br>
               <a:rPr lang="en-US" dirty="0"/>
             </a:br>
             <a:r>
               <a:rPr lang="en-US" dirty="0"/>
-              <a:t>dose </a:t>
-            </a:r>
-            <a:r>
-              <a:rPr lang="en-US" dirty="0"/>
-              <a:t>volumes</a:t>
+              <a:t>dose volumes</a:t>
             </a:r>
           </a:p>
         </p:txBody>
@@ -12561,11 +12202,7 @@
           <a:p>
             <a:r>
               <a:rPr lang="en-US" dirty="0"/>
-              <a:t>3. </a:t>
-            </a:r>
-            <a:r>
-              <a:rPr lang="en-US" dirty="0"/>
-              <a:t>Create output volume</a:t>
+              <a:t>3. Create output volume</a:t>
             </a:r>
           </a:p>
         </p:txBody>
@@ -12621,11 +12258,7 @@
           <a:p>
             <a:r>
               <a:rPr lang="en-US" dirty="0"/>
-              <a:t>4. </a:t>
-            </a:r>
-            <a:r>
-              <a:rPr lang="en-US" dirty="0"/>
-              <a:t>Click ‘Apply’</a:t>
+              <a:t>4. Click ‘Apply’</a:t>
             </a:r>
           </a:p>
         </p:txBody>
@@ -12768,13 +12401,6 @@
   <p:clrMapOvr>
     <a:masterClrMapping/>
   </p:clrMapOvr>
-  <p:timing>
-    <p:tnLst>
-      <p:par>
-        <p:cTn id="1" dur="indefinite" restart="never" nodeType="tmRoot"/>
-      </p:par>
-    </p:tnLst>
-  </p:timing>
 </p:sld>
 </file>
 
@@ -12848,7 +12474,7 @@
               <a:defRPr/>
             </a:pPr>
             <a:r>
-              <a:rPr lang="en-US" smtClean="0"/>
+              <a:rPr lang="en-US"/>
               <a:t>- </a:t>
             </a:r>
             <a:fld id="{CF70E430-998E-4908-836F-E9BC2B613AC2}" type="slidenum">
@@ -12859,7 +12485,7 @@
               <a:t>25</a:t>
             </a:fld>
             <a:r>
-              <a:rPr lang="en-US" smtClean="0"/>
+              <a:rPr lang="en-US"/>
               <a:t> -</a:t>
             </a:r>
             <a:endParaRPr lang="en-US" dirty="0"/>
@@ -12885,10 +12511,9 @@
               <a:defRPr/>
             </a:pPr>
             <a:r>
-              <a:rPr lang="en-US" dirty="0" smtClean="0"/>
+              <a:rPr lang="en-US" dirty="0"/>
               <a:t>Laboratory for Percutaneous Surgery – Copyright © Queen’s University, 2015</a:t>
             </a:r>
-            <a:endParaRPr lang="en-US" dirty="0"/>
           </a:p>
         </p:txBody>
       </p:sp>
@@ -13006,7 +12631,6 @@
               <a:rPr lang="en-CA" dirty="0"/>
               <a:t>5/2. Accumulate dose distributions</a:t>
             </a:r>
-            <a:endParaRPr lang="en-CA" dirty="0"/>
           </a:p>
         </p:txBody>
       </p:sp>
@@ -13181,15 +12805,7 @@
           <a:p>
             <a:r>
               <a:rPr lang="en-US" dirty="0"/>
-              <a:t>3. Create </a:t>
-            </a:r>
-            <a:r>
-              <a:rPr lang="en-US" dirty="0"/>
-              <a:t>new output </a:t>
-            </a:r>
-            <a:r>
-              <a:rPr lang="en-US" dirty="0"/>
-              <a:t>volume</a:t>
+              <a:t>3. Create new output volume</a:t>
             </a:r>
           </a:p>
         </p:txBody>
@@ -13316,13 +12932,6 @@
   <p:clrMapOvr>
     <a:masterClrMapping/>
   </p:clrMapOvr>
-  <p:timing>
-    <p:tnLst>
-      <p:par>
-        <p:cTn id="1" dur="indefinite" restart="never" nodeType="tmRoot"/>
-      </p:par>
-    </p:tnLst>
-  </p:timing>
 </p:sld>
 </file>
 
@@ -13396,7 +13005,7 @@
               <a:defRPr/>
             </a:pPr>
             <a:r>
-              <a:rPr lang="en-US" smtClean="0"/>
+              <a:rPr lang="en-US"/>
               <a:t>- </a:t>
             </a:r>
             <a:fld id="{CF70E430-998E-4908-836F-E9BC2B613AC2}" type="slidenum">
@@ -13407,7 +13016,7 @@
               <a:t>26</a:t>
             </a:fld>
             <a:r>
-              <a:rPr lang="en-US" smtClean="0"/>
+              <a:rPr lang="en-US"/>
               <a:t> -</a:t>
             </a:r>
             <a:endParaRPr lang="en-US" dirty="0"/>
@@ -13433,10 +13042,9 @@
               <a:defRPr/>
             </a:pPr>
             <a:r>
-              <a:rPr lang="en-US" dirty="0" smtClean="0"/>
+              <a:rPr lang="en-US" dirty="0"/>
               <a:t>Laboratory for Percutaneous Surgery – Copyright © Queen’s University, 2015</a:t>
             </a:r>
-            <a:endParaRPr lang="en-US" dirty="0"/>
           </a:p>
         </p:txBody>
       </p:sp>
@@ -13554,7 +13162,6 @@
               <a:rPr lang="en-CA" dirty="0"/>
               <a:t>6/1. Compute DVH for unregistered</a:t>
             </a:r>
-            <a:endParaRPr lang="en-CA" dirty="0"/>
           </a:p>
         </p:txBody>
       </p:sp>
@@ -13609,15 +13216,7 @@
           <a:p>
             <a:r>
               <a:rPr lang="en-US" dirty="0"/>
-              <a:t>1. Go to module Radiotherapy </a:t>
-            </a:r>
-            <a:r>
-              <a:rPr lang="en-US" dirty="0"/>
-              <a:t>/ Dose </a:t>
-            </a:r>
-            <a:r>
-              <a:rPr lang="en-US" dirty="0"/>
-              <a:t>Volume Histogram</a:t>
+              <a:t>1. Go to module Radiotherapy / Dose Volume Histogram</a:t>
             </a:r>
           </a:p>
         </p:txBody>
@@ -13673,15 +13272,7 @@
           <a:p>
             <a:r>
               <a:rPr lang="en-US" dirty="0"/>
-              <a:t>2. Choose </a:t>
-            </a:r>
-            <a:r>
-              <a:rPr lang="en-US" dirty="0"/>
-              <a:t>unregistered accumulated </a:t>
-            </a:r>
-            <a:r>
-              <a:rPr lang="en-US" dirty="0"/>
-              <a:t>dose</a:t>
+              <a:t>2. Choose unregistered accumulated dose</a:t>
             </a:r>
           </a:p>
         </p:txBody>
@@ -13737,17 +13328,8 @@
           <a:p>
             <a:r>
               <a:rPr lang="en-US" dirty="0"/>
-              <a:t>3. Choose ‘3</a:t>
-            </a:r>
-            <a:r>
-              <a:rPr lang="en-US" dirty="0"/>
-              <a:t>: RTSTRUCT: </a:t>
-            </a:r>
-            <a:r>
-              <a:rPr lang="en-US" dirty="0"/>
-              <a:t>ENT’</a:t>
-            </a:r>
-            <a:endParaRPr lang="en-US" dirty="0"/>
+              <a:t>3. Choose ‘3: RTSTRUCT: ENT’</a:t>
+            </a:r>
           </a:p>
         </p:txBody>
       </p:sp>
@@ -13802,11 +13384,7 @@
           <a:p>
             <a:r>
               <a:rPr lang="en-US" dirty="0"/>
-              <a:t>4. </a:t>
-            </a:r>
-            <a:r>
-              <a:rPr lang="en-US" dirty="0"/>
-              <a:t>Click ‘Compute DVH’</a:t>
+              <a:t>4. Click ‘Compute DVH’</a:t>
             </a:r>
           </a:p>
         </p:txBody>
@@ -13864,7 +13442,6 @@
               <a:rPr lang="en-US" dirty="0"/>
               <a:t>Optional: Choose individual structures to speed up computation</a:t>
             </a:r>
-            <a:endParaRPr lang="en-US" dirty="0"/>
           </a:p>
         </p:txBody>
       </p:sp>
@@ -14006,13 +13583,6 @@
   <p:clrMapOvr>
     <a:masterClrMapping/>
   </p:clrMapOvr>
-  <p:timing>
-    <p:tnLst>
-      <p:par>
-        <p:cTn id="1" dur="indefinite" restart="never" nodeType="tmRoot"/>
-      </p:par>
-    </p:tnLst>
-  </p:timing>
 </p:sld>
 </file>
 
@@ -14119,7 +13689,7 @@
               <a:defRPr/>
             </a:pPr>
             <a:r>
-              <a:rPr lang="en-US" smtClean="0"/>
+              <a:rPr lang="en-US"/>
               <a:t>- </a:t>
             </a:r>
             <a:fld id="{CF70E430-998E-4908-836F-E9BC2B613AC2}" type="slidenum">
@@ -14130,7 +13700,7 @@
               <a:t>27</a:t>
             </a:fld>
             <a:r>
-              <a:rPr lang="en-US" smtClean="0"/>
+              <a:rPr lang="en-US"/>
               <a:t> -</a:t>
             </a:r>
             <a:endParaRPr lang="en-US" dirty="0"/>
@@ -14156,10 +13726,9 @@
               <a:defRPr/>
             </a:pPr>
             <a:r>
-              <a:rPr lang="en-US" dirty="0" smtClean="0"/>
+              <a:rPr lang="en-US" dirty="0"/>
               <a:t>Laboratory for Percutaneous Surgery – Copyright © Queen’s University, 2015</a:t>
             </a:r>
-            <a:endParaRPr lang="en-US" dirty="0"/>
           </a:p>
         </p:txBody>
       </p:sp>
@@ -14277,7 +13846,6 @@
               <a:rPr lang="en-CA" dirty="0"/>
               <a:t>6/2. Compute DVH for registered</a:t>
             </a:r>
-            <a:endParaRPr lang="en-CA" dirty="0"/>
           </a:p>
         </p:txBody>
       </p:sp>
@@ -14450,20 +14018,8 @@
           </a:lstStyle>
           <a:p>
             <a:r>
-              <a:rPr lang="en-US" dirty="0" smtClean="0"/>
-              <a:t>3. </a:t>
-            </a:r>
-            <a:r>
               <a:rPr lang="en-US" dirty="0"/>
-              <a:t>Click ‘</a:t>
-            </a:r>
-            <a:r>
-              <a:rPr lang="en-US" dirty="0" smtClean="0"/>
-              <a:t>Show </a:t>
-            </a:r>
-            <a:r>
-              <a:rPr lang="en-US" dirty="0"/>
-              <a:t>all’</a:t>
+              <a:t>3. Click ‘Show all’</a:t>
             </a:r>
           </a:p>
         </p:txBody>
@@ -14518,12 +14074,8 @@
           </a:lstStyle>
           <a:p>
             <a:r>
-              <a:rPr lang="en-US" dirty="0" smtClean="0"/>
-              <a:t>4. </a:t>
-            </a:r>
-            <a:r>
               <a:rPr lang="en-US" dirty="0"/>
-              <a:t>DVH curves appear</a:t>
+              <a:t>4. DVH curves appear</a:t>
             </a:r>
           </a:p>
         </p:txBody>
@@ -14783,13 +14335,6 @@
   <p:clrMapOvr>
     <a:masterClrMapping/>
   </p:clrMapOvr>
-  <p:timing>
-    <p:tnLst>
-      <p:par>
-        <p:cTn id="1" dur="indefinite" restart="never" nodeType="tmRoot"/>
-      </p:par>
-    </p:tnLst>
-  </p:timing>
 </p:sld>
 </file>
 
@@ -14829,7 +14374,7 @@
               <a:defRPr/>
             </a:pPr>
             <a:r>
-              <a:rPr lang="en-US" smtClean="0"/>
+              <a:rPr lang="en-US"/>
               <a:t>- </a:t>
             </a:r>
             <a:fld id="{CF70E430-998E-4908-836F-E9BC2B613AC2}" type="slidenum">
@@ -14840,7 +14385,7 @@
               <a:t>28</a:t>
             </a:fld>
             <a:r>
-              <a:rPr lang="en-US" smtClean="0"/>
+              <a:rPr lang="en-US"/>
               <a:t> -</a:t>
             </a:r>
             <a:endParaRPr lang="en-US" dirty="0"/>
@@ -14866,10 +14411,9 @@
               <a:defRPr/>
             </a:pPr>
             <a:r>
-              <a:rPr lang="en-US" dirty="0" smtClean="0"/>
+              <a:rPr lang="en-US" dirty="0"/>
               <a:t>Laboratory for Percutaneous Surgery – Copyright © Queen’s University, 2015</a:t>
             </a:r>
-            <a:endParaRPr lang="en-US" dirty="0"/>
           </a:p>
         </p:txBody>
       </p:sp>
@@ -14987,7 +14531,6 @@
               <a:rPr lang="en-CA" dirty="0"/>
               <a:t>6/3. Quantify improvement</a:t>
             </a:r>
-            <a:endParaRPr lang="en-CA" dirty="0"/>
           </a:p>
         </p:txBody>
       </p:sp>
@@ -15181,13 +14724,6 @@
   <p:clrMapOvr>
     <a:masterClrMapping/>
   </p:clrMapOvr>
-  <p:timing>
-    <p:tnLst>
-      <p:par>
-        <p:cTn id="1" dur="indefinite" restart="never" nodeType="tmRoot"/>
-      </p:par>
-    </p:tnLst>
-  </p:timing>
 </p:sld>
 </file>
 
@@ -15329,7 +14865,7 @@
               <a:defRPr/>
             </a:pPr>
             <a:r>
-              <a:rPr lang="en-US" smtClean="0"/>
+              <a:rPr lang="en-US"/>
               <a:t>- </a:t>
             </a:r>
             <a:fld id="{CF70E430-998E-4908-836F-E9BC2B613AC2}" type="slidenum">
@@ -15340,7 +14876,7 @@
               <a:t>29</a:t>
             </a:fld>
             <a:r>
-              <a:rPr lang="en-US" smtClean="0"/>
+              <a:rPr lang="en-US"/>
               <a:t> -</a:t>
             </a:r>
             <a:endParaRPr lang="en-US" dirty="0"/>
@@ -15366,10 +14902,9 @@
               <a:defRPr/>
             </a:pPr>
             <a:r>
-              <a:rPr lang="en-US" dirty="0" smtClean="0"/>
+              <a:rPr lang="en-US" dirty="0"/>
               <a:t>Laboratory for Percutaneous Surgery – Copyright © Queen’s University, 2015</a:t>
             </a:r>
-            <a:endParaRPr lang="en-US" dirty="0"/>
           </a:p>
         </p:txBody>
       </p:sp>
@@ -15487,7 +15022,6 @@
               <a:rPr lang="en-CA" dirty="0"/>
               <a:t>6/4. Visualize improvement</a:t>
             </a:r>
-            <a:endParaRPr lang="en-CA" dirty="0"/>
           </a:p>
         </p:txBody>
       </p:sp>
@@ -15648,32 +15182,14 @@
           <a:p>
             <a:r>
               <a:rPr lang="en-US" dirty="0"/>
-              <a:t>Zoom </a:t>
-            </a:r>
-            <a:r>
-              <a:rPr lang="en-US" dirty="0" smtClean="0"/>
-              <a:t>by scroll, pan by left mouse button</a:t>
-            </a:r>
-            <a:endParaRPr lang="en-US" dirty="0"/>
+              <a:t>Zoom by scroll, pan by left mouse button</a:t>
+            </a:r>
           </a:p>
           <a:p>
             <a:r>
               <a:rPr lang="en-US" dirty="0"/>
-              <a:t>(</a:t>
-            </a:r>
-            <a:r>
-              <a:rPr lang="en-US" dirty="0"/>
-              <a:t>Reset zoom: double </a:t>
-            </a:r>
-            <a:r>
-              <a:rPr lang="en-US" dirty="0" smtClean="0"/>
-              <a:t>middle-click</a:t>
-            </a:r>
-            <a:r>
-              <a:rPr lang="en-US" dirty="0"/>
-              <a:t>)</a:t>
-            </a:r>
-            <a:endParaRPr lang="en-US" dirty="0"/>
+              <a:t>(Reset zoom: double middle-click)</a:t>
+            </a:r>
           </a:p>
         </p:txBody>
       </p:sp>
@@ -15751,13 +15267,6 @@
   <p:clrMapOvr>
     <a:masterClrMapping/>
   </p:clrMapOvr>
-  <p:timing>
-    <p:tnLst>
-      <p:par>
-        <p:cTn id="1" dur="indefinite" restart="never" nodeType="tmRoot"/>
-      </p:par>
-    </p:tnLst>
-  </p:timing>
 </p:sld>
 </file>
 
@@ -15814,23 +15323,7 @@
                   <a:srgbClr val="000000"/>
                 </a:solidFill>
               </a:rPr>
-              <a:t>Install </a:t>
-            </a:r>
-            <a:r>
-              <a:rPr lang="en-US" altLang="en-US" sz="2800" dirty="0" smtClean="0">
-                <a:solidFill>
-                  <a:srgbClr val="000000"/>
-                </a:solidFill>
-              </a:rPr>
-              <a:t>required </a:t>
-            </a:r>
-            <a:r>
-              <a:rPr lang="en-US" altLang="en-US" sz="2800" dirty="0" smtClean="0">
-                <a:solidFill>
-                  <a:srgbClr val="000000"/>
-                </a:solidFill>
-              </a:rPr>
-              <a:t>software</a:t>
+              <a:t>Install required software</a:t>
             </a:r>
           </a:p>
           <a:p>
@@ -15845,18 +15338,13 @@
               <a:buAutoNum type="arabicPeriod"/>
             </a:pPr>
             <a:r>
-              <a:rPr lang="en-US" altLang="en-US" sz="2800" dirty="0" smtClean="0">
+              <a:rPr lang="en-US" altLang="en-US" sz="2800" dirty="0">
                 <a:solidFill>
                   <a:srgbClr val="000000"/>
                 </a:solidFill>
               </a:rPr>
               <a:t>Download and load tutorial dataset</a:t>
             </a:r>
-            <a:endParaRPr lang="en-US" altLang="en-US" sz="2800" dirty="0">
-              <a:solidFill>
-                <a:srgbClr val="000000"/>
-              </a:solidFill>
-            </a:endParaRPr>
           </a:p>
           <a:p>
             <a:pPr eaLnBrk="1" hangingPunct="1">
@@ -15870,18 +15358,13 @@
               <a:buAutoNum type="arabicPeriod"/>
             </a:pPr>
             <a:r>
-              <a:rPr lang="en-US" altLang="en-US" sz="2800" dirty="0" smtClean="0">
+              <a:rPr lang="en-US" altLang="en-US" sz="2800" dirty="0">
                 <a:solidFill>
                   <a:srgbClr val="000000"/>
                 </a:solidFill>
               </a:rPr>
               <a:t>Perform rigid registration on CT images</a:t>
             </a:r>
-            <a:endParaRPr lang="en-US" altLang="en-US" sz="2800" dirty="0">
-              <a:solidFill>
-                <a:srgbClr val="000000"/>
-              </a:solidFill>
-            </a:endParaRPr>
           </a:p>
           <a:p>
             <a:pPr eaLnBrk="1" hangingPunct="1">
@@ -15895,18 +15378,13 @@
               <a:buAutoNum type="arabicPeriod"/>
             </a:pPr>
             <a:r>
-              <a:rPr lang="en-US" altLang="en-US" sz="2800" dirty="0" smtClean="0">
+              <a:rPr lang="en-US" altLang="en-US" sz="2800" dirty="0">
                 <a:solidFill>
                   <a:srgbClr val="000000"/>
                 </a:solidFill>
               </a:rPr>
               <a:t>Transform day 2 dose volume</a:t>
             </a:r>
-            <a:endParaRPr lang="en-US" altLang="en-US" sz="2800" dirty="0" smtClean="0">
-              <a:solidFill>
-                <a:srgbClr val="000000"/>
-              </a:solidFill>
-            </a:endParaRPr>
           </a:p>
           <a:p>
             <a:pPr eaLnBrk="1" hangingPunct="1">
@@ -15920,7 +15398,7 @@
               <a:buAutoNum type="arabicPeriod"/>
             </a:pPr>
             <a:r>
-              <a:rPr lang="en-US" altLang="en-US" sz="2800" dirty="0" smtClean="0">
+              <a:rPr lang="en-US" altLang="en-US" sz="2800" dirty="0">
                 <a:solidFill>
                   <a:srgbClr val="000000"/>
                 </a:solidFill>
@@ -15940,7 +15418,7 @@
               <a:buAutoNum type="arabicPeriod"/>
             </a:pPr>
             <a:r>
-              <a:rPr lang="en-US" altLang="en-US" sz="2800" dirty="0" smtClean="0">
+              <a:rPr lang="en-US" altLang="en-US" sz="2800" dirty="0">
                 <a:solidFill>
                   <a:srgbClr val="000000"/>
                 </a:solidFill>
@@ -15994,27 +15472,8 @@
                   </a:schemeClr>
                 </a:solidFill>
               </a:rPr>
-              <a:t>+2. Compare dose distributions using </a:t>
-            </a:r>
-            <a:r>
-              <a:rPr lang="en-US" altLang="en-US" sz="2800" dirty="0" smtClean="0">
-                <a:solidFill>
-                  <a:schemeClr val="tx1">
-                    <a:lumMod val="50000"/>
-                    <a:lumOff val="50000"/>
-                  </a:schemeClr>
-                </a:solidFill>
-              </a:rPr>
-              <a:t>gamma</a:t>
-            </a:r>
-            <a:endParaRPr lang="en-US" altLang="en-US" sz="2800" dirty="0">
-              <a:solidFill>
-                <a:schemeClr val="tx1">
-                  <a:lumMod val="50000"/>
-                  <a:lumOff val="50000"/>
-                </a:schemeClr>
-              </a:solidFill>
-            </a:endParaRPr>
+              <a:t>+2. Compare dose distributions using gamma</a:t>
+            </a:r>
           </a:p>
         </p:txBody>
       </p:sp>
@@ -16034,10 +15493,9 @@
           <a:lstStyle/>
           <a:p>
             <a:r>
-              <a:rPr lang="en-US" dirty="0" smtClean="0"/>
+              <a:rPr lang="en-US" dirty="0"/>
               <a:t>Overview</a:t>
             </a:r>
-            <a:endParaRPr lang="en-US" dirty="0"/>
           </a:p>
         </p:txBody>
       </p:sp>
@@ -16060,7 +15518,7 @@
               <a:defRPr/>
             </a:pPr>
             <a:r>
-              <a:rPr lang="en-US" smtClean="0"/>
+              <a:rPr lang="en-US"/>
               <a:t>- </a:t>
             </a:r>
             <a:fld id="{CF70E430-998E-4908-836F-E9BC2B613AC2}" type="slidenum">
@@ -16071,7 +15529,7 @@
               <a:t>3</a:t>
             </a:fld>
             <a:r>
-              <a:rPr lang="en-US" smtClean="0"/>
+              <a:rPr lang="en-US"/>
               <a:t> -</a:t>
             </a:r>
             <a:endParaRPr lang="en-US" dirty="0"/>
@@ -16097,7 +15555,7 @@
               <a:defRPr/>
             </a:pPr>
             <a:r>
-              <a:rPr lang="en-US" smtClean="0"/>
+              <a:rPr lang="en-US"/>
               <a:t>Laboratory for Percutaneous Surgery – Copyright © Queen’s University, 2019</a:t>
             </a:r>
             <a:endParaRPr lang="en-US" dirty="0"/>
@@ -16153,7 +15611,7 @@
               <a:defRPr/>
             </a:pPr>
             <a:r>
-              <a:rPr lang="en-US" smtClean="0"/>
+              <a:rPr lang="en-US"/>
               <a:t>- </a:t>
             </a:r>
             <a:fld id="{CF70E430-998E-4908-836F-E9BC2B613AC2}" type="slidenum">
@@ -16164,7 +15622,7 @@
               <a:t>30</a:t>
             </a:fld>
             <a:r>
-              <a:rPr lang="en-US" smtClean="0"/>
+              <a:rPr lang="en-US"/>
               <a:t> -</a:t>
             </a:r>
             <a:endParaRPr lang="en-US" dirty="0"/>
@@ -16190,10 +15648,9 @@
               <a:defRPr/>
             </a:pPr>
             <a:r>
-              <a:rPr lang="en-US" dirty="0" smtClean="0"/>
+              <a:rPr lang="en-US" dirty="0"/>
               <a:t>Laboratory for Percutaneous Surgery – Copyright © Queen’s University, 2015</a:t>
             </a:r>
-            <a:endParaRPr lang="en-US" dirty="0"/>
           </a:p>
         </p:txBody>
       </p:sp>
@@ -16359,7 +15816,7 @@
           </a:lstStyle>
           <a:p>
             <a:r>
-              <a:rPr lang="en-CA" sz="6600" b="1" dirty="0" smtClean="0">
+              <a:rPr lang="en-CA" sz="6600" b="1" dirty="0">
                 <a:solidFill>
                   <a:srgbClr val="780000"/>
                 </a:solidFill>
@@ -16420,13 +15877,6 @@
   <p:clrMapOvr>
     <a:masterClrMapping/>
   </p:clrMapOvr>
-  <p:timing>
-    <p:tnLst>
-      <p:par>
-        <p:cTn id="1" dur="indefinite" restart="never" nodeType="tmRoot"/>
-      </p:par>
-    </p:tnLst>
-  </p:timing>
 </p:sld>
 </file>
 
@@ -16463,10 +15913,9 @@
           <a:lstStyle/>
           <a:p>
             <a:r>
-              <a:rPr lang="en-US" dirty="0" smtClean="0"/>
+              <a:rPr lang="en-US" dirty="0"/>
               <a:t>Appendix: Optional steps for IGRT</a:t>
             </a:r>
-            <a:endParaRPr lang="en-US" dirty="0"/>
           </a:p>
         </p:txBody>
       </p:sp>
@@ -16489,7 +15938,7 @@
               <a:defRPr/>
             </a:pPr>
             <a:r>
-              <a:rPr lang="en-US" smtClean="0"/>
+              <a:rPr lang="en-US"/>
               <a:t>- </a:t>
             </a:r>
             <a:fld id="{CF70E430-998E-4908-836F-E9BC2B613AC2}" type="slidenum">
@@ -16500,7 +15949,7 @@
               <a:t>31</a:t>
             </a:fld>
             <a:r>
-              <a:rPr lang="en-US" smtClean="0"/>
+              <a:rPr lang="en-US"/>
               <a:t> -</a:t>
             </a:r>
             <a:endParaRPr lang="en-US" dirty="0"/>
@@ -16526,7 +15975,7 @@
               <a:defRPr/>
             </a:pPr>
             <a:r>
-              <a:rPr lang="en-US" smtClean="0"/>
+              <a:rPr lang="en-US"/>
               <a:t>Laboratory for Percutaneous Surgery – Copyright © Queen’s University, 2019</a:t>
             </a:r>
             <a:endParaRPr lang="en-US" dirty="0"/>
@@ -16585,13 +16034,8 @@
           <a:p>
             <a:r>
               <a:rPr lang="en-US" dirty="0"/>
-              <a:t>Optional 1/1. Isodose </a:t>
-            </a:r>
-            <a:r>
-              <a:rPr lang="en-US" dirty="0" smtClean="0"/>
-              <a:t>lines/surfaces</a:t>
-            </a:r>
-            <a:endParaRPr lang="en-US" dirty="0"/>
+              <a:t>Optional 1/1. Isodose lines/surfaces</a:t>
+            </a:r>
           </a:p>
         </p:txBody>
       </p:sp>
@@ -16614,7 +16058,7 @@
               <a:defRPr/>
             </a:pPr>
             <a:r>
-              <a:rPr lang="en-US" smtClean="0"/>
+              <a:rPr lang="en-US"/>
               <a:t>- </a:t>
             </a:r>
             <a:fld id="{CF70E430-998E-4908-836F-E9BC2B613AC2}" type="slidenum">
@@ -16625,7 +16069,7 @@
               <a:t>32</a:t>
             </a:fld>
             <a:r>
-              <a:rPr lang="en-US" smtClean="0"/>
+              <a:rPr lang="en-US"/>
               <a:t> -</a:t>
             </a:r>
             <a:endParaRPr lang="en-US" dirty="0"/>
@@ -16651,7 +16095,7 @@
               <a:defRPr/>
             </a:pPr>
             <a:r>
-              <a:rPr lang="en-US" smtClean="0"/>
+              <a:rPr lang="en-US"/>
               <a:t>Laboratory for Percutaneous Surgery – Copyright © Queen’s University, 2019</a:t>
             </a:r>
             <a:endParaRPr lang="en-US" dirty="0"/>
@@ -16959,10 +16403,9 @@
           <a:lstStyle/>
           <a:p>
             <a:r>
-              <a:rPr lang="en-US" dirty="0" smtClean="0"/>
+              <a:rPr lang="en-US" dirty="0"/>
               <a:t>Optional 1/2. Isodose lines/surfaces</a:t>
             </a:r>
-            <a:endParaRPr lang="en-US" dirty="0"/>
           </a:p>
         </p:txBody>
       </p:sp>
@@ -16985,7 +16428,7 @@
               <a:defRPr/>
             </a:pPr>
             <a:r>
-              <a:rPr lang="en-US" smtClean="0"/>
+              <a:rPr lang="en-US"/>
               <a:t>- </a:t>
             </a:r>
             <a:fld id="{CF70E430-998E-4908-836F-E9BC2B613AC2}" type="slidenum">
@@ -16996,7 +16439,7 @@
               <a:t>33</a:t>
             </a:fld>
             <a:r>
-              <a:rPr lang="en-US" smtClean="0"/>
+              <a:rPr lang="en-US"/>
               <a:t> -</a:t>
             </a:r>
             <a:endParaRPr lang="en-US" dirty="0"/>
@@ -17022,7 +16465,7 @@
               <a:defRPr/>
             </a:pPr>
             <a:r>
-              <a:rPr lang="en-US" smtClean="0"/>
+              <a:rPr lang="en-US"/>
               <a:t>Laboratory for Percutaneous Surgery – Copyright © Queen’s University, 2019</a:t>
             </a:r>
             <a:endParaRPr lang="en-US" dirty="0"/>
@@ -17114,10 +16557,9 @@
           <a:lstStyle/>
           <a:p>
             <a:r>
-              <a:rPr lang="en-US" dirty="0" smtClean="0"/>
+              <a:rPr lang="en-US" dirty="0"/>
               <a:t>Optional 2/1. Compare dose volumes using gamma comparison</a:t>
             </a:r>
-            <a:endParaRPr lang="en-US" dirty="0"/>
           </a:p>
         </p:txBody>
       </p:sp>
@@ -17140,7 +16582,7 @@
               <a:defRPr/>
             </a:pPr>
             <a:r>
-              <a:rPr lang="en-US" smtClean="0"/>
+              <a:rPr lang="en-US"/>
               <a:t>- </a:t>
             </a:r>
             <a:fld id="{CF70E430-998E-4908-836F-E9BC2B613AC2}" type="slidenum">
@@ -17151,7 +16593,7 @@
               <a:t>34</a:t>
             </a:fld>
             <a:r>
-              <a:rPr lang="en-US" smtClean="0"/>
+              <a:rPr lang="en-US"/>
               <a:t> -</a:t>
             </a:r>
             <a:endParaRPr lang="en-US" dirty="0"/>
@@ -17177,7 +16619,7 @@
               <a:defRPr/>
             </a:pPr>
             <a:r>
-              <a:rPr lang="en-US" smtClean="0"/>
+              <a:rPr lang="en-US"/>
               <a:t>Laboratory for Percutaneous Surgery – Copyright © Queen’s University, 2019</a:t>
             </a:r>
             <a:endParaRPr lang="en-US" dirty="0"/>
@@ -17331,11 +16773,7 @@
           <a:p>
             <a:r>
               <a:rPr lang="en-US" dirty="0"/>
-              <a:t>2. Set </a:t>
-            </a:r>
-            <a:r>
-              <a:rPr lang="en-US" dirty="0"/>
-              <a:t>input volumes you</a:t>
+              <a:t>2. Set input volumes you</a:t>
             </a:r>
             <a:br>
               <a:rPr lang="en-US" dirty="0"/>
@@ -17344,7 +16782,6 @@
               <a:rPr lang="en-US" dirty="0"/>
               <a:t>want to compare</a:t>
             </a:r>
-            <a:endParaRPr lang="en-US" dirty="0"/>
           </a:p>
         </p:txBody>
       </p:sp>
@@ -17399,13 +16836,8 @@
           <a:p>
             <a:r>
               <a:rPr lang="en-US" dirty="0"/>
-              <a:t>3. Create </a:t>
-            </a:r>
-            <a:r>
-              <a:rPr lang="en-US" dirty="0"/>
-              <a:t>new output gamma volume</a:t>
-            </a:r>
-            <a:endParaRPr lang="en-US" dirty="0"/>
+              <a:t>3. Create new output gamma volume</a:t>
+            </a:r>
           </a:p>
         </p:txBody>
       </p:sp>
@@ -17460,13 +16892,8 @@
           <a:p>
             <a:r>
               <a:rPr lang="en-US" dirty="0"/>
-              <a:t>4. Click </a:t>
-            </a:r>
-            <a:r>
-              <a:rPr lang="en-US" dirty="0" smtClean="0"/>
-              <a:t>‘Calculate gamma’</a:t>
-            </a:r>
-            <a:endParaRPr lang="en-US" dirty="0"/>
+              <a:t>4. Click ‘Calculate gamma’</a:t>
+            </a:r>
           </a:p>
         </p:txBody>
       </p:sp>
@@ -17903,7 +17330,7 @@
               <a:defRPr/>
             </a:pPr>
             <a:r>
-              <a:rPr lang="en-US" smtClean="0"/>
+              <a:rPr lang="en-US"/>
               <a:t>- </a:t>
             </a:r>
             <a:fld id="{CF70E430-998E-4908-836F-E9BC2B613AC2}" type="slidenum">
@@ -17914,7 +17341,7 @@
               <a:t>35</a:t>
             </a:fld>
             <a:r>
-              <a:rPr lang="en-US" smtClean="0"/>
+              <a:rPr lang="en-US"/>
               <a:t> -</a:t>
             </a:r>
             <a:endParaRPr lang="en-US" dirty="0"/>
@@ -17940,10 +17367,9 @@
               <a:defRPr/>
             </a:pPr>
             <a:r>
-              <a:rPr lang="en-US" dirty="0" smtClean="0"/>
+              <a:rPr lang="en-US" dirty="0"/>
               <a:t>Laboratory for Percutaneous Surgery – Copyright © Queen’s University, 2015</a:t>
             </a:r>
-            <a:endParaRPr lang="en-US" dirty="0"/>
           </a:p>
         </p:txBody>
       </p:sp>
@@ -18058,7 +17484,6 @@
               <a:rPr lang="en-CA" dirty="0"/>
               <a:t>Optional 2/2. Evaluate improvement</a:t>
             </a:r>
-            <a:endParaRPr lang="en-CA" dirty="0"/>
           </a:p>
         </p:txBody>
       </p:sp>
@@ -18317,14 +17742,14 @@
               <a:buNone/>
             </a:pPr>
             <a:r>
-              <a:rPr lang="en-CA" dirty="0" smtClean="0"/>
+              <a:rPr lang="en-CA" dirty="0"/>
               <a:t>Plan dose</a:t>
             </a:r>
             <a:br>
-              <a:rPr lang="en-CA" dirty="0" smtClean="0"/>
+              <a:rPr lang="en-CA" dirty="0"/>
             </a:br>
             <a:r>
-              <a:rPr lang="en-CA" dirty="0" smtClean="0"/>
+              <a:rPr lang="en-CA" dirty="0"/>
               <a:t>vs</a:t>
             </a:r>
           </a:p>
@@ -18333,17 +17758,16 @@
               <a:buNone/>
             </a:pPr>
             <a:r>
-              <a:rPr lang="en-CA" dirty="0" smtClean="0"/>
+              <a:rPr lang="en-CA" dirty="0"/>
               <a:t>Uncorrected</a:t>
             </a:r>
             <a:br>
-              <a:rPr lang="en-CA" dirty="0" smtClean="0"/>
+              <a:rPr lang="en-CA" dirty="0"/>
             </a:br>
             <a:r>
-              <a:rPr lang="en-CA" dirty="0" smtClean="0"/>
+              <a:rPr lang="en-CA" dirty="0"/>
               <a:t>Day 2 dose</a:t>
             </a:r>
-            <a:endParaRPr lang="en-CA" dirty="0"/>
           </a:p>
         </p:txBody>
       </p:sp>
@@ -18534,14 +17958,14 @@
               <a:buNone/>
             </a:pPr>
             <a:r>
-              <a:rPr lang="en-CA" dirty="0" smtClean="0"/>
+              <a:rPr lang="en-CA" dirty="0"/>
               <a:t>Plan dose</a:t>
             </a:r>
             <a:br>
-              <a:rPr lang="en-CA" dirty="0" smtClean="0"/>
+              <a:rPr lang="en-CA" dirty="0"/>
             </a:br>
             <a:r>
-              <a:rPr lang="en-CA" dirty="0" smtClean="0"/>
+              <a:rPr lang="en-CA" dirty="0"/>
               <a:t>vs</a:t>
             </a:r>
           </a:p>
@@ -18550,17 +17974,16 @@
               <a:buNone/>
             </a:pPr>
             <a:r>
-              <a:rPr lang="en-CA" dirty="0" smtClean="0"/>
+              <a:rPr lang="en-CA" dirty="0"/>
               <a:t>Corrected</a:t>
             </a:r>
             <a:br>
-              <a:rPr lang="en-CA" dirty="0" smtClean="0"/>
+              <a:rPr lang="en-CA" dirty="0"/>
             </a:br>
             <a:r>
-              <a:rPr lang="en-CA" dirty="0" smtClean="0"/>
+              <a:rPr lang="en-CA" dirty="0"/>
               <a:t>Day 2 dose</a:t>
             </a:r>
-            <a:endParaRPr lang="en-CA" dirty="0"/>
           </a:p>
         </p:txBody>
       </p:sp>
@@ -18574,13 +17997,6 @@
   <p:clrMapOvr>
     <a:masterClrMapping/>
   </p:clrMapOvr>
-  <p:timing>
-    <p:tnLst>
-      <p:par>
-        <p:cTn id="1" dur="indefinite" restart="never" nodeType="tmRoot"/>
-      </p:par>
-    </p:tnLst>
-  </p:timing>
 </p:sld>
 </file>
 
@@ -18629,10 +18045,6 @@
               </a:rPr>
               <a:t>https://download.slicer.org/</a:t>
             </a:r>
-            <a:r>
-              <a:rPr lang="en-CA" dirty="0"/>
-              <a:t/>
-            </a:r>
             <a:br>
               <a:rPr lang="en-CA" dirty="0"/>
             </a:br>
@@ -18681,10 +18093,9 @@
           <a:lstStyle/>
           <a:p>
             <a:r>
-              <a:rPr lang="en-US" dirty="0" smtClean="0"/>
+              <a:rPr lang="en-US" dirty="0"/>
               <a:t>1/1. Install 3D Slicer</a:t>
             </a:r>
-            <a:endParaRPr lang="en-US" dirty="0"/>
           </a:p>
         </p:txBody>
       </p:sp>
@@ -18707,7 +18118,7 @@
               <a:defRPr/>
             </a:pPr>
             <a:r>
-              <a:rPr lang="en-US" smtClean="0"/>
+              <a:rPr lang="en-US"/>
               <a:t>- </a:t>
             </a:r>
             <a:fld id="{CF70E430-998E-4908-836F-E9BC2B613AC2}" type="slidenum">
@@ -18718,7 +18129,7 @@
               <a:t>4</a:t>
             </a:fld>
             <a:r>
-              <a:rPr lang="en-US" smtClean="0"/>
+              <a:rPr lang="en-US"/>
               <a:t> -</a:t>
             </a:r>
             <a:endParaRPr lang="en-US" dirty="0"/>
@@ -18744,7 +18155,7 @@
               <a:defRPr/>
             </a:pPr>
             <a:r>
-              <a:rPr lang="en-US" smtClean="0"/>
+              <a:rPr lang="en-US"/>
               <a:t>Laboratory for Percutaneous Surgery – Copyright © Queen’s University, 2019</a:t>
             </a:r>
             <a:endParaRPr lang="en-US" dirty="0"/>
@@ -18798,13 +18209,8 @@
           <a:p>
             <a:r>
               <a:rPr lang="en-US" dirty="0"/>
-              <a:t>1/2. Install SlicerRT </a:t>
-            </a:r>
-            <a:r>
-              <a:rPr lang="en-US" dirty="0" smtClean="0"/>
-              <a:t>extension</a:t>
-            </a:r>
-            <a:endParaRPr lang="en-US" dirty="0"/>
+              <a:t>1/2. Install SlicerRT extension</a:t>
+            </a:r>
           </a:p>
         </p:txBody>
       </p:sp>
@@ -18827,7 +18233,7 @@
               <a:defRPr/>
             </a:pPr>
             <a:r>
-              <a:rPr lang="en-US" smtClean="0"/>
+              <a:rPr lang="en-US"/>
               <a:t>- </a:t>
             </a:r>
             <a:fld id="{CF70E430-998E-4908-836F-E9BC2B613AC2}" type="slidenum">
@@ -18838,7 +18244,7 @@
               <a:t>5</a:t>
             </a:fld>
             <a:r>
-              <a:rPr lang="en-US" smtClean="0"/>
+              <a:rPr lang="en-US"/>
               <a:t> -</a:t>
             </a:r>
             <a:endParaRPr lang="en-US" dirty="0"/>
@@ -18864,7 +18270,7 @@
               <a:defRPr/>
             </a:pPr>
             <a:r>
-              <a:rPr lang="en-US" smtClean="0"/>
+              <a:rPr lang="en-US"/>
               <a:t>Laboratory for Percutaneous Surgery – Copyright © Queen’s University, 2019</a:t>
             </a:r>
             <a:endParaRPr lang="en-US" dirty="0"/>
@@ -19254,10 +18660,9 @@
               <a:buNone/>
             </a:pPr>
             <a:r>
-              <a:rPr lang="en-CA" dirty="0" smtClean="0"/>
+              <a:rPr lang="en-CA" dirty="0"/>
               <a:t>or</a:t>
             </a:r>
-            <a:endParaRPr lang="en-CA" dirty="0"/>
           </a:p>
         </p:txBody>
       </p:sp>
@@ -19307,10 +18712,9 @@
           <a:lstStyle/>
           <a:p>
             <a:r>
-              <a:rPr lang="en-US" dirty="0" smtClean="0"/>
+              <a:rPr lang="en-US" dirty="0"/>
               <a:t>1/3. Install SlicerRT extension</a:t>
             </a:r>
-            <a:endParaRPr lang="en-US" dirty="0"/>
           </a:p>
         </p:txBody>
       </p:sp>
@@ -19333,7 +18737,7 @@
               <a:defRPr/>
             </a:pPr>
             <a:r>
-              <a:rPr lang="en-US" smtClean="0"/>
+              <a:rPr lang="en-US"/>
               <a:t>- </a:t>
             </a:r>
             <a:fld id="{CF70E430-998E-4908-836F-E9BC2B613AC2}" type="slidenum">
@@ -19344,7 +18748,7 @@
               <a:t>6</a:t>
             </a:fld>
             <a:r>
-              <a:rPr lang="en-US" smtClean="0"/>
+              <a:rPr lang="en-US"/>
               <a:t> -</a:t>
             </a:r>
             <a:endParaRPr lang="en-US" dirty="0"/>
@@ -19370,7 +18774,7 @@
               <a:defRPr/>
             </a:pPr>
             <a:r>
-              <a:rPr lang="en-US" smtClean="0"/>
+              <a:rPr lang="en-US"/>
               <a:t>Laboratory for Percutaneous Surgery – Copyright © Queen’s University, 2019</a:t>
             </a:r>
             <a:endParaRPr lang="en-US" dirty="0"/>
@@ -19526,24 +18930,24 @@
           <a:lstStyle/>
           <a:p>
             <a:r>
-              <a:rPr lang="en-US" dirty="0" smtClean="0"/>
+              <a:rPr lang="en-US" dirty="0"/>
               <a:t>Download planning study from</a:t>
             </a:r>
             <a:br>
-              <a:rPr lang="en-US" dirty="0" smtClean="0"/>
+              <a:rPr lang="en-US" dirty="0"/>
             </a:br>
             <a:r>
               <a:rPr lang="en-US" sz="1800" dirty="0">
                 <a:hlinkClick r:id="rId2"/>
               </a:rPr>
-              <a:t>https://pocus.cs.queensu.ca/#item/5d4c7c9b01d4930406c46b5d</a:t>
-            </a:r>
-            <a:endParaRPr lang="en-US" sz="1200" dirty="0" smtClean="0"/>
+              <a:t>https://github.com/SlicerRt/SlicerRtData/tree/master/eclipse-8.1.20-phantom-ent</a:t>
+            </a:r>
+            <a:endParaRPr lang="en-US" sz="1200" dirty="0"/>
           </a:p>
           <a:p>
             <a:pPr lvl="1"/>
             <a:r>
-              <a:rPr lang="en-US" dirty="0" smtClean="0"/>
+              <a:rPr lang="en-US" dirty="0"/>
               <a:t>Unzip it in a folder</a:t>
             </a:r>
           </a:p>
@@ -19551,58 +18955,54 @@
             <a:pPr lvl="1"/>
             <a:r>
               <a:rPr lang="en-US" dirty="0"/>
-              <a:t>Note: S</a:t>
-            </a:r>
-            <a:r>
-              <a:rPr lang="en-US" dirty="0" smtClean="0"/>
-              <a:t>ame </a:t>
-            </a:r>
-            <a:r>
-              <a:rPr lang="en-US" dirty="0"/>
-              <a:t>as </a:t>
-            </a:r>
-            <a:r>
-              <a:rPr lang="en-US" dirty="0" smtClean="0">
+              <a:t>Note: Same as </a:t>
+            </a:r>
+            <a:r>
+              <a:rPr lang="en-US" dirty="0">
                 <a:hlinkClick r:id="rId3" action="ppaction://hlinkfile"/>
               </a:rPr>
               <a:t>eclipse-8.1.20-phantom-ent</a:t>
             </a:r>
             <a:r>
-              <a:rPr lang="en-US" dirty="0" smtClean="0"/>
+              <a:rPr lang="en-US" dirty="0"/>
               <a:t> dataset</a:t>
             </a:r>
           </a:p>
           <a:p>
             <a:r>
-              <a:rPr lang="en-US" dirty="0" smtClean="0"/>
+              <a:rPr lang="en-US" dirty="0"/>
               <a:t>Download day 2 data</a:t>
             </a:r>
           </a:p>
           <a:p>
             <a:pPr lvl="1"/>
             <a:r>
-              <a:rPr lang="en-US" dirty="0" smtClean="0"/>
+              <a:rPr lang="en-US" dirty="0"/>
               <a:t>CT: </a:t>
             </a:r>
             <a:r>
               <a:rPr lang="en-US" sz="1800" dirty="0">
                 <a:hlinkClick r:id="rId4"/>
               </a:rPr>
-              <a:t>https://pocus.cs.queensu.ca/#item/5d4c7c9601d4930406c46b57</a:t>
-            </a:r>
-            <a:endParaRPr lang="en-US" sz="2400" dirty="0" smtClean="0"/>
+              <a:t>https://slicer.kitware.com/midas3/item/10702</a:t>
+            </a:r>
+            <a:endParaRPr lang="en-US" sz="2400" dirty="0"/>
           </a:p>
           <a:p>
             <a:pPr lvl="1"/>
             <a:r>
-              <a:rPr lang="en-US" dirty="0" smtClean="0"/>
-              <a:t>Dose: </a:t>
-            </a:r>
-            <a:r>
-              <a:rPr lang="en-US" sz="1800" dirty="0">
+              <a:rPr lang="en-US" dirty="0"/>
+              <a:t>Dose</a:t>
+            </a:r>
+            <a:r>
+              <a:rPr lang="en-US"/>
+              <a:t>: </a:t>
+            </a:r>
+            <a:r>
+              <a:rPr lang="en-US" sz="1800">
                 <a:hlinkClick r:id="rId5"/>
               </a:rPr>
-              <a:t>https://pocus.cs.queensu.ca/#item/5d4c7c9701d4930406c46b5a</a:t>
+              <a:t>https://slicer.kitware.com/midas3/item/10703</a:t>
             </a:r>
             <a:endParaRPr lang="en-US" dirty="0"/>
           </a:p>
@@ -19617,17 +19017,17 @@
               <a:buNone/>
             </a:pPr>
             <a:r>
-              <a:rPr lang="en-US" dirty="0" smtClean="0"/>
+              <a:rPr lang="en-US" dirty="0"/>
               <a:t>Note: Can download whole folder instead:</a:t>
             </a:r>
             <a:br>
-              <a:rPr lang="en-US" dirty="0" smtClean="0"/>
+              <a:rPr lang="en-US" dirty="0"/>
             </a:br>
             <a:r>
-              <a:rPr lang="en-US" sz="1200" dirty="0">
+              <a:rPr lang="en-US" sz="1600" dirty="0">
                 <a:hlinkClick r:id="rId6"/>
               </a:rPr>
-              <a:t>https://pocus.cs.queensu.ca/#collection/5cc8811601d4930406c40465/folder/5d4c7b2d01d4930406c46b55</a:t>
+              <a:t>https://slicer.kitware.com/midas3/download/folder/861/EclipseEntComputedDay2Data.zip</a:t>
             </a:r>
             <a:endParaRPr lang="en-US" dirty="0"/>
           </a:p>
@@ -19649,10 +19049,9 @@
           <a:lstStyle/>
           <a:p>
             <a:r>
-              <a:rPr lang="en-US" dirty="0" smtClean="0"/>
+              <a:rPr lang="en-US" dirty="0"/>
               <a:t>2/1. Download tutorial dataset</a:t>
             </a:r>
-            <a:endParaRPr lang="en-US" dirty="0"/>
           </a:p>
         </p:txBody>
       </p:sp>
@@ -19675,7 +19074,7 @@
               <a:defRPr/>
             </a:pPr>
             <a:r>
-              <a:rPr lang="en-US" smtClean="0"/>
+              <a:rPr lang="en-US"/>
               <a:t>- </a:t>
             </a:r>
             <a:fld id="{CF70E430-998E-4908-836F-E9BC2B613AC2}" type="slidenum">
@@ -19686,7 +19085,7 @@
               <a:t>7</a:t>
             </a:fld>
             <a:r>
-              <a:rPr lang="en-US" smtClean="0"/>
+              <a:rPr lang="en-US"/>
               <a:t> -</a:t>
             </a:r>
             <a:endParaRPr lang="en-US" dirty="0"/>
@@ -19712,7 +19111,7 @@
               <a:defRPr/>
             </a:pPr>
             <a:r>
-              <a:rPr lang="en-US" smtClean="0"/>
+              <a:rPr lang="en-US"/>
               <a:t>Laboratory for Percutaneous Surgery – Copyright © Queen’s University, 2019</a:t>
             </a:r>
             <a:endParaRPr lang="en-US" dirty="0"/>
@@ -19799,14 +19198,9 @@
           <a:lstStyle/>
           <a:p>
             <a:r>
-              <a:rPr lang="en-US" dirty="0" smtClean="0"/>
-              <a:t>2/2. </a:t>
-            </a:r>
-            <a:r>
-              <a:rPr lang="en-US" dirty="0" smtClean="0"/>
-              <a:t>Import DICOM dataset</a:t>
-            </a:r>
-            <a:endParaRPr lang="en-US" dirty="0"/>
+              <a:rPr lang="en-US" dirty="0"/>
+              <a:t>2/2. Import DICOM dataset</a:t>
+            </a:r>
           </a:p>
         </p:txBody>
       </p:sp>
@@ -19829,7 +19223,7 @@
               <a:defRPr/>
             </a:pPr>
             <a:r>
-              <a:rPr lang="en-US" smtClean="0"/>
+              <a:rPr lang="en-US"/>
               <a:t>- </a:t>
             </a:r>
             <a:fld id="{CF70E430-998E-4908-836F-E9BC2B613AC2}" type="slidenum">
@@ -19840,7 +19234,7 @@
               <a:t>8</a:t>
             </a:fld>
             <a:r>
-              <a:rPr lang="en-US" smtClean="0"/>
+              <a:rPr lang="en-US"/>
               <a:t> -</a:t>
             </a:r>
             <a:endParaRPr lang="en-US" dirty="0"/>
@@ -19866,7 +19260,7 @@
               <a:defRPr/>
             </a:pPr>
             <a:r>
-              <a:rPr lang="en-US" smtClean="0"/>
+              <a:rPr lang="en-US"/>
               <a:t>Laboratory for Percutaneous Surgery – Copyright © Queen’s University, 2019</a:t>
             </a:r>
             <a:endParaRPr lang="en-US" dirty="0"/>
@@ -20130,11 +19524,7 @@
             </a:r>
             <a:r>
               <a:rPr lang="en-CA" dirty="0"/>
-              <a:t> folder </a:t>
-            </a:r>
-            <a:r>
-              <a:rPr lang="en-CA" dirty="0"/>
-              <a:t>named</a:t>
+              <a:t> folder named</a:t>
             </a:r>
             <a:br>
               <a:rPr lang="en-CA" dirty="0"/>
@@ -20142,10 +19532,6 @@
             <a:r>
               <a:rPr lang="en-CA" i="1" dirty="0" err="1"/>
               <a:t>EclipseEntPhantomRtData</a:t>
-            </a:r>
-            <a:r>
-              <a:rPr lang="en-CA" i="1" dirty="0"/>
-              <a:t/>
             </a:r>
             <a:br>
               <a:rPr lang="en-CA" i="1" dirty="0"/>
@@ -20207,22 +19593,9 @@
           </a:lstStyle>
           <a:p>
             <a:r>
-              <a:rPr lang="en-US" dirty="0" smtClean="0"/>
-              <a:t>You may </a:t>
-            </a:r>
-            <a:r>
               <a:rPr lang="en-US" dirty="0"/>
-              <a:t>be prompted </a:t>
-            </a:r>
-            <a:r>
-              <a:rPr lang="en-US" dirty="0" smtClean="0"/>
-              <a:t>for a database </a:t>
-            </a:r>
-            <a:r>
-              <a:rPr lang="en-US" dirty="0"/>
-              <a:t>folder here</a:t>
-            </a:r>
-            <a:endParaRPr lang="en-US" dirty="0"/>
+              <a:t>You may be prompted for a database folder here</a:t>
+            </a:r>
           </a:p>
         </p:txBody>
       </p:sp>
@@ -20364,18 +19737,9 @@
           </a:lstStyle>
           <a:p>
             <a:r>
-              <a:rPr lang="en-US" dirty="0" smtClean="0"/>
-              <a:t>You may </a:t>
-            </a:r>
-            <a:r>
               <a:rPr lang="en-US" dirty="0"/>
-              <a:t>be </a:t>
-            </a:r>
-            <a:r>
-              <a:rPr lang="en-US" dirty="0" smtClean="0"/>
-              <a:t>asked whether to ‘Copy’ or ‘Add link’. Choose ‘Add link’</a:t>
-            </a:r>
-            <a:endParaRPr lang="en-US" dirty="0"/>
+              <a:t>You may be asked whether to ‘Copy’ or ‘Add link’. Choose ‘Add link’</a:t>
+            </a:r>
           </a:p>
         </p:txBody>
       </p:sp>
@@ -20509,10 +19873,9 @@
           <a:lstStyle/>
           <a:p>
             <a:r>
-              <a:rPr lang="en-US" dirty="0" smtClean="0"/>
+              <a:rPr lang="en-US" dirty="0"/>
               <a:t>2/2A. Alternative import</a:t>
             </a:r>
-            <a:endParaRPr lang="en-US" dirty="0"/>
           </a:p>
         </p:txBody>
       </p:sp>
@@ -20535,7 +19898,7 @@
               <a:defRPr/>
             </a:pPr>
             <a:r>
-              <a:rPr lang="en-US" smtClean="0"/>
+              <a:rPr lang="en-US"/>
               <a:t>- </a:t>
             </a:r>
             <a:fld id="{CF70E430-998E-4908-836F-E9BC2B613AC2}" type="slidenum">
@@ -20546,7 +19909,7 @@
               <a:t>9</a:t>
             </a:fld>
             <a:r>
-              <a:rPr lang="en-US" smtClean="0"/>
+              <a:rPr lang="en-US"/>
               <a:t> -</a:t>
             </a:r>
             <a:endParaRPr lang="en-US" dirty="0"/>
@@ -20572,7 +19935,7 @@
               <a:defRPr/>
             </a:pPr>
             <a:r>
-              <a:rPr lang="en-US" smtClean="0"/>
+              <a:rPr lang="en-US"/>
               <a:t>Laboratory for Percutaneous Surgery – Copyright © Queen’s University, 2019</a:t>
             </a:r>
             <a:endParaRPr lang="en-US" dirty="0"/>

</xml_diff>